<commit_message>
Update git part 2 slides
</commit_message>
<xml_diff>
--- a/git_course/2_collaboration/git_collaboration.pptx
+++ b/git_course/2_collaboration/git_collaboration.pptx
@@ -256,7 +256,7 @@
           <a:p>
             <a:fld id="{3BADDCAA-88FC-44D4-A91A-DD0530AB88E0}" type="datetimeFigureOut">
               <a:rPr lang="en-NL" smtClean="0"/>
-              <a:t>28/11/2024</a:t>
+              <a:t>04/12/2024</a:t>
             </a:fld>
             <a:endParaRPr lang="en-NL"/>
           </a:p>
@@ -4615,7 +4615,7 @@
           <a:p>
             <a:fld id="{0EBB069A-003F-4FC0-8534-236B0C5C7B5F}" type="datetimeFigureOut">
               <a:rPr lang="en-NL" smtClean="0"/>
-              <a:t>28/11/2024</a:t>
+              <a:t>04/12/2024</a:t>
             </a:fld>
             <a:endParaRPr lang="en-NL"/>
           </a:p>
@@ -4815,7 +4815,7 @@
           <a:p>
             <a:fld id="{0EBB069A-003F-4FC0-8534-236B0C5C7B5F}" type="datetimeFigureOut">
               <a:rPr lang="en-NL" smtClean="0"/>
-              <a:t>28/11/2024</a:t>
+              <a:t>04/12/2024</a:t>
             </a:fld>
             <a:endParaRPr lang="en-NL"/>
           </a:p>
@@ -5025,7 +5025,7 @@
           <a:p>
             <a:fld id="{0EBB069A-003F-4FC0-8534-236B0C5C7B5F}" type="datetimeFigureOut">
               <a:rPr lang="en-NL" smtClean="0"/>
-              <a:t>28/11/2024</a:t>
+              <a:t>04/12/2024</a:t>
             </a:fld>
             <a:endParaRPr lang="en-NL"/>
           </a:p>
@@ -5225,7 +5225,7 @@
           <a:p>
             <a:fld id="{0EBB069A-003F-4FC0-8534-236B0C5C7B5F}" type="datetimeFigureOut">
               <a:rPr lang="en-NL" smtClean="0"/>
-              <a:t>28/11/2024</a:t>
+              <a:t>04/12/2024</a:t>
             </a:fld>
             <a:endParaRPr lang="en-NL"/>
           </a:p>
@@ -5501,7 +5501,7 @@
           <a:p>
             <a:fld id="{0EBB069A-003F-4FC0-8534-236B0C5C7B5F}" type="datetimeFigureOut">
               <a:rPr lang="en-NL" smtClean="0"/>
-              <a:t>28/11/2024</a:t>
+              <a:t>04/12/2024</a:t>
             </a:fld>
             <a:endParaRPr lang="en-NL"/>
           </a:p>
@@ -5769,7 +5769,7 @@
           <a:p>
             <a:fld id="{0EBB069A-003F-4FC0-8534-236B0C5C7B5F}" type="datetimeFigureOut">
               <a:rPr lang="en-NL" smtClean="0"/>
-              <a:t>28/11/2024</a:t>
+              <a:t>04/12/2024</a:t>
             </a:fld>
             <a:endParaRPr lang="en-NL"/>
           </a:p>
@@ -6184,7 +6184,7 @@
           <a:p>
             <a:fld id="{0EBB069A-003F-4FC0-8534-236B0C5C7B5F}" type="datetimeFigureOut">
               <a:rPr lang="en-NL" smtClean="0"/>
-              <a:t>28/11/2024</a:t>
+              <a:t>04/12/2024</a:t>
             </a:fld>
             <a:endParaRPr lang="en-NL"/>
           </a:p>
@@ -6326,7 +6326,7 @@
           <a:p>
             <a:fld id="{0EBB069A-003F-4FC0-8534-236B0C5C7B5F}" type="datetimeFigureOut">
               <a:rPr lang="en-NL" smtClean="0"/>
-              <a:t>28/11/2024</a:t>
+              <a:t>04/12/2024</a:t>
             </a:fld>
             <a:endParaRPr lang="en-NL"/>
           </a:p>
@@ -6439,7 +6439,7 @@
           <a:p>
             <a:fld id="{0EBB069A-003F-4FC0-8534-236B0C5C7B5F}" type="datetimeFigureOut">
               <a:rPr lang="en-NL" smtClean="0"/>
-              <a:t>28/11/2024</a:t>
+              <a:t>04/12/2024</a:t>
             </a:fld>
             <a:endParaRPr lang="en-NL"/>
           </a:p>
@@ -6752,7 +6752,7 @@
           <a:p>
             <a:fld id="{0EBB069A-003F-4FC0-8534-236B0C5C7B5F}" type="datetimeFigureOut">
               <a:rPr lang="en-NL" smtClean="0"/>
-              <a:t>28/11/2024</a:t>
+              <a:t>04/12/2024</a:t>
             </a:fld>
             <a:endParaRPr lang="en-NL"/>
           </a:p>
@@ -7041,7 +7041,7 @@
           <a:p>
             <a:fld id="{0EBB069A-003F-4FC0-8534-236B0C5C7B5F}" type="datetimeFigureOut">
               <a:rPr lang="en-NL" smtClean="0"/>
-              <a:t>28/11/2024</a:t>
+              <a:t>04/12/2024</a:t>
             </a:fld>
             <a:endParaRPr lang="en-NL"/>
           </a:p>
@@ -7284,7 +7284,7 @@
           <a:p>
             <a:fld id="{0EBB069A-003F-4FC0-8534-236B0C5C7B5F}" type="datetimeFigureOut">
               <a:rPr lang="en-NL" smtClean="0"/>
-              <a:t>28/11/2024</a:t>
+              <a:t>04/12/2024</a:t>
             </a:fld>
             <a:endParaRPr lang="en-NL"/>
           </a:p>
@@ -10965,9 +10965,14 @@
           <a:lstStyle/>
           <a:p>
             <a:r>
-              <a:rPr lang="nl-NL" noProof="0" dirty="0"/>
-              <a:t>Wijzigingen synchroniseren</a:t>
-            </a:r>
+              <a:rPr lang="nl-NL" dirty="0"/>
+              <a:t>S</a:t>
+            </a:r>
+            <a:r>
+              <a:rPr lang="nl-NL" noProof="0" dirty="0" err="1"/>
+              <a:t>ynchroniseren</a:t>
+            </a:r>
+            <a:endParaRPr lang="nl-NL" noProof="0" dirty="0"/>
           </a:p>
         </p:txBody>
       </p:sp>
@@ -13971,32 +13976,17 @@
               </a:spcAft>
             </a:pPr>
             <a:r>
+              <a:rPr lang="nl-NL" sz="2000" dirty="0"/>
+              <a:t>G</a:t>
+            </a:r>
+            <a:r>
+              <a:rPr lang="nl-NL" sz="2000" noProof="0" dirty="0" err="1"/>
+              <a:t>edistribueerd</a:t>
+            </a:r>
+            <a:r>
               <a:rPr lang="nl-NL" sz="2000" noProof="0" dirty="0"/>
-              <a:t>Git is gedistribueerd</a:t>
-            </a:r>
-          </a:p>
-          <a:p>
-            <a:pPr lvl="1">
-              <a:spcAft>
-                <a:spcPts val="600"/>
-              </a:spcAft>
-            </a:pPr>
-            <a:r>
-              <a:rPr lang="nl-NL" sz="1600" noProof="0" dirty="0"/>
-              <a:t>Gedistribueerd systeem?</a:t>
-            </a:r>
-          </a:p>
-          <a:p>
-            <a:pPr lvl="1">
-              <a:spcAft>
-                <a:spcPts val="600"/>
-              </a:spcAft>
-            </a:pPr>
-            <a:r>
-              <a:rPr lang="nl-NL" sz="1600" dirty="0"/>
-              <a:t>Remote repositories</a:t>
-            </a:r>
-            <a:endParaRPr lang="nl-NL" sz="1600" noProof="0" dirty="0"/>
+              <a:t> systeem</a:t>
+            </a:r>
           </a:p>
           <a:p>
             <a:pPr>
@@ -14006,36 +13996,13 @@
             </a:pPr>
             <a:r>
               <a:rPr lang="nl-NL" sz="2000" noProof="0" dirty="0"/>
-              <a:t>Samenwerken</a:t>
+              <a:t>Remote </a:t>
+            </a:r>
+            <a:r>
+              <a:rPr lang="nl-NL" sz="2000" noProof="0" dirty="0" err="1"/>
+              <a:t>repository</a:t>
             </a:r>
             <a:endParaRPr lang="nl-NL" sz="2000" dirty="0"/>
-          </a:p>
-          <a:p>
-            <a:pPr lvl="1">
-              <a:spcAft>
-                <a:spcPts val="600"/>
-              </a:spcAft>
-            </a:pPr>
-            <a:r>
-              <a:rPr lang="nl-NL" sz="1600" noProof="0" dirty="0"/>
-              <a:t>Pull </a:t>
-            </a:r>
-            <a:r>
-              <a:rPr lang="nl-NL" sz="1600" noProof="0" dirty="0" err="1"/>
-              <a:t>requests</a:t>
-            </a:r>
-            <a:endParaRPr lang="nl-NL" sz="1600" noProof="0" dirty="0"/>
-          </a:p>
-          <a:p>
-            <a:pPr lvl="1">
-              <a:spcAft>
-                <a:spcPts val="600"/>
-              </a:spcAft>
-            </a:pPr>
-            <a:r>
-              <a:rPr lang="nl-NL" sz="1600" dirty="0"/>
-              <a:t>Code reviews</a:t>
-            </a:r>
           </a:p>
           <a:p>
             <a:pPr>
@@ -14044,35 +14011,70 @@
               </a:spcAft>
             </a:pPr>
             <a:r>
+              <a:rPr lang="nl-NL" sz="2000" dirty="0"/>
+              <a:t>Synchroniseren</a:t>
+            </a:r>
+          </a:p>
+          <a:p>
+            <a:pPr>
+              <a:spcAft>
+                <a:spcPts val="600"/>
+              </a:spcAft>
+            </a:pPr>
+            <a:r>
+              <a:rPr lang="nl-NL" sz="2000" dirty="0"/>
+              <a:t>Pull </a:t>
+            </a:r>
+            <a:r>
               <a:rPr lang="nl-NL" sz="2000" dirty="0" err="1"/>
-              <a:t>Continuous</a:t>
+              <a:t>requests</a:t>
+            </a:r>
+            <a:endParaRPr lang="nl-NL" sz="2000" dirty="0"/>
+          </a:p>
+          <a:p>
+            <a:pPr>
+              <a:spcAft>
+                <a:spcPts val="600"/>
+              </a:spcAft>
+            </a:pPr>
+            <a:r>
+              <a:rPr lang="nl-NL" sz="2000" dirty="0" err="1"/>
+              <a:t>Workflows</a:t>
             </a:r>
             <a:r>
               <a:rPr lang="nl-NL" sz="2000" dirty="0"/>
-              <a:t> Integration</a:t>
-            </a:r>
-          </a:p>
-          <a:p>
-            <a:pPr lvl="1">
+              <a:t> en Actions</a:t>
+            </a:r>
+          </a:p>
+          <a:p>
+            <a:pPr>
               <a:spcAft>
                 <a:spcPts val="600"/>
               </a:spcAft>
             </a:pPr>
             <a:r>
-              <a:rPr lang="nl-NL" sz="1600" dirty="0"/>
-              <a:t>Hoe werkt het?</a:t>
-            </a:r>
-          </a:p>
-          <a:p>
-            <a:pPr lvl="1">
+              <a:rPr lang="nl-NL" sz="2000" dirty="0"/>
+              <a:t>Branches beveiligen</a:t>
+            </a:r>
+          </a:p>
+          <a:p>
+            <a:pPr>
               <a:spcAft>
                 <a:spcPts val="600"/>
               </a:spcAft>
             </a:pPr>
             <a:r>
-              <a:rPr lang="nl-NL" sz="1600" dirty="0"/>
-              <a:t>Python pipeline opzetten</a:t>
-            </a:r>
+              <a:rPr lang="nl-NL" sz="2000" dirty="0"/>
+              <a:t>Werkzaamheden beheren</a:t>
+            </a:r>
+          </a:p>
+          <a:p>
+            <a:pPr>
+              <a:spcAft>
+                <a:spcPts val="600"/>
+              </a:spcAft>
+            </a:pPr>
+            <a:endParaRPr lang="nl-NL" sz="2000" dirty="0"/>
           </a:p>
         </p:txBody>
       </p:sp>
@@ -20825,8 +20827,12 @@
           <a:lstStyle/>
           <a:p>
             <a:r>
+              <a:rPr lang="nl-NL" noProof="0" dirty="0" err="1"/>
+              <a:t>Workflows</a:t>
+            </a:r>
+            <a:r>
               <a:rPr lang="nl-NL" noProof="0" dirty="0"/>
-              <a:t>Pipelines</a:t>
+              <a:t> en Actions</a:t>
             </a:r>
           </a:p>
         </p:txBody>
@@ -29732,8 +29738,12 @@
           <a:lstStyle/>
           <a:p>
             <a:r>
+              <a:rPr lang="nl-NL" noProof="0"/>
+              <a:t>Werkzaamheden </a:t>
+            </a:r>
+            <a:r>
               <a:rPr lang="nl-NL" noProof="0" dirty="0"/>
-              <a:t>Werk managen</a:t>
+              <a:t>beheren</a:t>
             </a:r>
           </a:p>
         </p:txBody>

</xml_diff>

<commit_message>
Finalize git part 2
</commit_message>
<xml_diff>
--- a/git_course/2_collaboration/git_collaboration.pptx
+++ b/git_course/2_collaboration/git_collaboration.pptx
@@ -44,11 +44,11 @@
     <p:sldId id="484" r:id="rId35"/>
     <p:sldId id="481" r:id="rId36"/>
     <p:sldId id="482" r:id="rId37"/>
-    <p:sldId id="445" r:id="rId38"/>
-    <p:sldId id="448" r:id="rId39"/>
-    <p:sldId id="444" r:id="rId40"/>
-    <p:sldId id="449" r:id="rId41"/>
-    <p:sldId id="389" r:id="rId42"/>
+    <p:sldId id="449" r:id="rId38"/>
+    <p:sldId id="389" r:id="rId39"/>
+    <p:sldId id="445" r:id="rId40"/>
+    <p:sldId id="448" r:id="rId41"/>
+    <p:sldId id="444" r:id="rId42"/>
     <p:sldId id="493" r:id="rId43"/>
     <p:sldId id="385" r:id="rId44"/>
     <p:sldId id="384" r:id="rId45"/>
@@ -573,7 +573,7 @@
           <a:p>
             <a:r>
               <a:rPr lang="nl-NL" dirty="0"/>
-              <a:t>Demo: GitHub </a:t>
+              <a:t>Demo: GH: </a:t>
             </a:r>
             <a:r>
               <a:rPr lang="nl-NL" dirty="0" err="1"/>
@@ -833,7 +833,15 @@
             </a:pPr>
             <a:r>
               <a:rPr lang="nl-NL" dirty="0"/>
-              <a:t>Demo: GitHub PR maken</a:t>
+              <a:t>Demo: GH: </a:t>
+            </a:r>
+            <a:r>
+              <a:rPr lang="nl-NL" dirty="0" err="1"/>
+              <a:t>create</a:t>
+            </a:r>
+            <a:r>
+              <a:rPr lang="nl-NL" dirty="0"/>
+              <a:t> PR</a:t>
             </a:r>
           </a:p>
         </p:txBody>
@@ -1086,7 +1094,7 @@
             </a:pPr>
             <a:r>
               <a:rPr lang="nl-NL" dirty="0"/>
-              <a:t>Demo: GitHub PR reviewen</a:t>
+              <a:t>Demo: GH: review PR</a:t>
             </a:r>
           </a:p>
         </p:txBody>
@@ -1462,18 +1470,7 @@
               <a:tabLst/>
               <a:defRPr/>
             </a:pPr>
-            <a:r>
-              <a:rPr lang="nl-NL" dirty="0"/>
-              <a:t>Demo: </a:t>
-            </a:r>
-            <a:r>
-              <a:rPr lang="nl-NL" dirty="0" err="1"/>
-              <a:t>create</a:t>
-            </a:r>
-            <a:r>
-              <a:rPr lang="nl-NL" dirty="0"/>
-              <a:t> workflow.</a:t>
-            </a:r>
+            <a:endParaRPr lang="nl-NL" dirty="0"/>
           </a:p>
         </p:txBody>
       </p:sp>
@@ -1723,7 +1720,18 @@
               <a:tabLst/>
               <a:defRPr/>
             </a:pPr>
-            <a:endParaRPr lang="nl-NL" dirty="0"/>
+            <a:r>
+              <a:rPr lang="nl-NL" dirty="0"/>
+              <a:t>Demo: GH: </a:t>
+            </a:r>
+            <a:r>
+              <a:rPr lang="nl-NL" dirty="0" err="1"/>
+              <a:t>create</a:t>
+            </a:r>
+            <a:r>
+              <a:rPr lang="nl-NL" dirty="0"/>
+              <a:t> workflow.</a:t>
+            </a:r>
           </a:p>
         </p:txBody>
       </p:sp>
@@ -2089,22 +2097,6 @@
               <a:tabLst/>
               <a:defRPr/>
             </a:pPr>
-            <a:r>
-              <a:rPr lang="nl-NL" dirty="0"/>
-              <a:t>Demo: </a:t>
-            </a:r>
-            <a:r>
-              <a:rPr lang="nl-NL" dirty="0" err="1"/>
-              <a:t>create</a:t>
-            </a:r>
-            <a:r>
-              <a:rPr lang="nl-NL" dirty="0"/>
-              <a:t> </a:t>
-            </a:r>
-            <a:r>
-              <a:rPr lang="nl-NL" dirty="0" err="1"/>
-              <a:t>ruleset</a:t>
-            </a:r>
             <a:endParaRPr lang="nl-NL" dirty="0"/>
           </a:p>
         </p:txBody>
@@ -2230,6 +2222,22 @@
               <a:tabLst/>
               <a:defRPr/>
             </a:pPr>
+            <a:r>
+              <a:rPr lang="nl-NL" dirty="0"/>
+              <a:t>Demo: GH : </a:t>
+            </a:r>
+            <a:r>
+              <a:rPr lang="nl-NL" dirty="0" err="1"/>
+              <a:t>create</a:t>
+            </a:r>
+            <a:r>
+              <a:rPr lang="nl-NL" dirty="0"/>
+              <a:t> </a:t>
+            </a:r>
+            <a:r>
+              <a:rPr lang="nl-NL" dirty="0" err="1"/>
+              <a:t>ruleset</a:t>
+            </a:r>
             <a:endParaRPr lang="nl-NL" dirty="0"/>
           </a:p>
         </p:txBody>
@@ -2320,7 +2328,18 @@
           <a:bodyPr/>
           <a:lstStyle/>
           <a:p>
-            <a:endParaRPr lang="nl-NL" dirty="0"/>
+            <a:r>
+              <a:rPr lang="nl-NL" dirty="0"/>
+              <a:t>Demo: </a:t>
+            </a:r>
+            <a:r>
+              <a:rPr lang="nl-NL" dirty="0" err="1"/>
+              <a:t>create</a:t>
+            </a:r>
+            <a:r>
+              <a:rPr lang="nl-NL" dirty="0"/>
+              <a:t> issue</a:t>
+            </a:r>
           </a:p>
         </p:txBody>
       </p:sp>
@@ -2341,7 +2360,7 @@
           <a:p>
             <a:fld id="{4BAF0DEA-1372-46C0-8FC9-2869E9CCF7DA}" type="slidenum">
               <a:rPr lang="en-NL" smtClean="0"/>
-              <a:t>43</a:t>
+              <a:t>37</a:t>
             </a:fld>
             <a:endParaRPr lang="en-NL"/>
           </a:p>
@@ -2350,7 +2369,7 @@
     </p:spTree>
     <p:extLst>
       <p:ext uri="{BB962C8B-B14F-4D97-AF65-F5344CB8AC3E}">
-        <p14:creationId xmlns:p14="http://schemas.microsoft.com/office/powerpoint/2010/main" val="2525951610"/>
+        <p14:creationId xmlns:p14="http://schemas.microsoft.com/office/powerpoint/2010/main" val="3065146948"/>
       </p:ext>
     </p:extLst>
   </p:cSld>
@@ -2404,18 +2423,7 @@
           <a:bodyPr/>
           <a:lstStyle/>
           <a:p>
-            <a:r>
-              <a:rPr lang="nl-NL" dirty="0"/>
-              <a:t>Demo: DevOps </a:t>
-            </a:r>
-            <a:r>
-              <a:rPr lang="nl-NL" dirty="0" err="1"/>
-              <a:t>repo</a:t>
-            </a:r>
-            <a:r>
-              <a:rPr lang="nl-NL" dirty="0"/>
-              <a:t> aanmaken</a:t>
-            </a:r>
+            <a:endParaRPr lang="nl-NL" dirty="0"/>
           </a:p>
         </p:txBody>
       </p:sp>
@@ -2436,6 +2444,106 @@
           <a:p>
             <a:fld id="{4BAF0DEA-1372-46C0-8FC9-2869E9CCF7DA}" type="slidenum">
               <a:rPr lang="en-NL" smtClean="0"/>
+              <a:t>43</a:t>
+            </a:fld>
+            <a:endParaRPr lang="en-NL"/>
+          </a:p>
+        </p:txBody>
+      </p:sp>
+    </p:spTree>
+    <p:extLst>
+      <p:ext uri="{BB962C8B-B14F-4D97-AF65-F5344CB8AC3E}">
+        <p14:creationId xmlns:p14="http://schemas.microsoft.com/office/powerpoint/2010/main" val="2525951610"/>
+      </p:ext>
+    </p:extLst>
+  </p:cSld>
+  <p:clrMapOvr>
+    <a:masterClrMapping/>
+  </p:clrMapOvr>
+</p:notes>
+</file>
+
+<file path=ppt/notesSlides/notesSlide24.xml><?xml version="1.0" encoding="utf-8"?>
+<p:notes xmlns:a="http://schemas.openxmlformats.org/drawingml/2006/main" xmlns:r="http://schemas.openxmlformats.org/officeDocument/2006/relationships" xmlns:p="http://schemas.openxmlformats.org/presentationml/2006/main">
+  <p:cSld>
+    <p:spTree>
+      <p:nvGrpSpPr>
+        <p:cNvPr id="1" name=""/>
+        <p:cNvGrpSpPr/>
+        <p:nvPr/>
+      </p:nvGrpSpPr>
+      <p:grpSpPr>
+        <a:xfrm>
+          <a:off x="0" y="0"/>
+          <a:ext cx="0" cy="0"/>
+          <a:chOff x="0" y="0"/>
+          <a:chExt cx="0" cy="0"/>
+        </a:xfrm>
+      </p:grpSpPr>
+      <p:sp>
+        <p:nvSpPr>
+          <p:cNvPr id="2" name="Slide Image Placeholder 1"/>
+          <p:cNvSpPr>
+            <a:spLocks noGrp="1" noRot="1" noChangeAspect="1"/>
+          </p:cNvSpPr>
+          <p:nvPr>
+            <p:ph type="sldImg"/>
+          </p:nvPr>
+        </p:nvSpPr>
+        <p:spPr/>
+      </p:sp>
+      <p:sp>
+        <p:nvSpPr>
+          <p:cNvPr id="3" name="Notes Placeholder 2"/>
+          <p:cNvSpPr>
+            <a:spLocks noGrp="1"/>
+          </p:cNvSpPr>
+          <p:nvPr>
+            <p:ph type="body" idx="1"/>
+          </p:nvPr>
+        </p:nvSpPr>
+        <p:spPr/>
+        <p:txBody>
+          <a:bodyPr/>
+          <a:lstStyle/>
+          <a:p>
+            <a:r>
+              <a:rPr lang="nl-NL" dirty="0"/>
+              <a:t>Demo: AD: </a:t>
+            </a:r>
+            <a:r>
+              <a:rPr lang="nl-NL" dirty="0" err="1"/>
+              <a:t>create</a:t>
+            </a:r>
+            <a:r>
+              <a:rPr lang="nl-NL" dirty="0"/>
+              <a:t> project + </a:t>
+            </a:r>
+            <a:r>
+              <a:rPr lang="nl-NL" dirty="0" err="1"/>
+              <a:t>repo</a:t>
+            </a:r>
+            <a:endParaRPr lang="nl-NL" dirty="0"/>
+          </a:p>
+        </p:txBody>
+      </p:sp>
+      <p:sp>
+        <p:nvSpPr>
+          <p:cNvPr id="4" name="Slide Number Placeholder 3"/>
+          <p:cNvSpPr>
+            <a:spLocks noGrp="1"/>
+          </p:cNvSpPr>
+          <p:nvPr>
+            <p:ph type="sldNum" sz="quarter" idx="5"/>
+          </p:nvPr>
+        </p:nvSpPr>
+        <p:spPr/>
+        <p:txBody>
+          <a:bodyPr/>
+          <a:lstStyle/>
+          <a:p>
+            <a:fld id="{4BAF0DEA-1372-46C0-8FC9-2869E9CCF7DA}" type="slidenum">
+              <a:rPr lang="en-NL" smtClean="0"/>
               <a:t>45</a:t>
             </a:fld>
             <a:endParaRPr lang="en-NL"/>
@@ -2455,7 +2563,7 @@
 </p:notes>
 </file>
 
-<file path=ppt/notesSlides/notesSlide24.xml><?xml version="1.0" encoding="utf-8"?>
+<file path=ppt/notesSlides/notesSlide25.xml><?xml version="1.0" encoding="utf-8"?>
 <p:notes xmlns:a="http://schemas.openxmlformats.org/drawingml/2006/main" xmlns:r="http://schemas.openxmlformats.org/officeDocument/2006/relationships" xmlns:p="http://schemas.openxmlformats.org/presentationml/2006/main">
   <p:cSld>
     <p:spTree>
@@ -2580,7 +2688,7 @@
 </p:notes>
 </file>
 
-<file path=ppt/notesSlides/notesSlide25.xml><?xml version="1.0" encoding="utf-8"?>
+<file path=ppt/notesSlides/notesSlide26.xml><?xml version="1.0" encoding="utf-8"?>
 <p:notes xmlns:a="http://schemas.openxmlformats.org/drawingml/2006/main" xmlns:r="http://schemas.openxmlformats.org/officeDocument/2006/relationships" xmlns:p="http://schemas.openxmlformats.org/presentationml/2006/main">
   <p:cSld>
     <p:spTree>
@@ -2705,7 +2813,7 @@
 </p:notes>
 </file>
 
-<file path=ppt/notesSlides/notesSlide26.xml><?xml version="1.0" encoding="utf-8"?>
+<file path=ppt/notesSlides/notesSlide27.xml><?xml version="1.0" encoding="utf-8"?>
 <p:notes xmlns:a="http://schemas.openxmlformats.org/drawingml/2006/main" xmlns:r="http://schemas.openxmlformats.org/officeDocument/2006/relationships" xmlns:p="http://schemas.openxmlformats.org/presentationml/2006/main">
   <p:cSld>
     <p:spTree>
@@ -2830,7 +2938,7 @@
 </p:notes>
 </file>
 
-<file path=ppt/notesSlides/notesSlide27.xml><?xml version="1.0" encoding="utf-8"?>
+<file path=ppt/notesSlides/notesSlide28.xml><?xml version="1.0" encoding="utf-8"?>
 <p:notes xmlns:a="http://schemas.openxmlformats.org/drawingml/2006/main" xmlns:r="http://schemas.openxmlformats.org/officeDocument/2006/relationships" xmlns:p="http://schemas.openxmlformats.org/presentationml/2006/main">
   <p:cSld>
     <p:spTree>
@@ -2909,6 +3017,14 @@
               <a:tabLst/>
               <a:defRPr/>
             </a:pPr>
+            <a:r>
+              <a:rPr lang="nl-NL" dirty="0"/>
+              <a:t>Demo: AD: pull </a:t>
+            </a:r>
+            <a:r>
+              <a:rPr lang="nl-NL" dirty="0" err="1"/>
+              <a:t>requests</a:t>
+            </a:r>
             <a:endParaRPr lang="nl-NL" dirty="0"/>
           </a:p>
         </p:txBody>
@@ -2955,7 +3071,7 @@
 </p:notes>
 </file>
 
-<file path=ppt/notesSlides/notesSlide28.xml><?xml version="1.0" encoding="utf-8"?>
+<file path=ppt/notesSlides/notesSlide29.xml><?xml version="1.0" encoding="utf-8"?>
 <p:notes xmlns:a="http://schemas.openxmlformats.org/drawingml/2006/main" xmlns:r="http://schemas.openxmlformats.org/officeDocument/2006/relationships" xmlns:p="http://schemas.openxmlformats.org/presentationml/2006/main">
   <p:cSld>
     <p:spTree>
@@ -3071,131 +3187,6 @@
     <p:extLst>
       <p:ext uri="{BB962C8B-B14F-4D97-AF65-F5344CB8AC3E}">
         <p14:creationId xmlns:p14="http://schemas.microsoft.com/office/powerpoint/2010/main" val="2516896634"/>
-      </p:ext>
-    </p:extLst>
-  </p:cSld>
-  <p:clrMapOvr>
-    <a:masterClrMapping/>
-  </p:clrMapOvr>
-</p:notes>
-</file>
-
-<file path=ppt/notesSlides/notesSlide29.xml><?xml version="1.0" encoding="utf-8"?>
-<p:notes xmlns:a="http://schemas.openxmlformats.org/drawingml/2006/main" xmlns:r="http://schemas.openxmlformats.org/officeDocument/2006/relationships" xmlns:p="http://schemas.openxmlformats.org/presentationml/2006/main">
-  <p:cSld>
-    <p:spTree>
-      <p:nvGrpSpPr>
-        <p:cNvPr id="1" name="">
-          <a:extLst>
-            <a:ext uri="{FF2B5EF4-FFF2-40B4-BE49-F238E27FC236}">
-              <a16:creationId xmlns:a16="http://schemas.microsoft.com/office/drawing/2014/main" id="{45876175-95F1-BB96-2A19-C19D57211E2C}"/>
-            </a:ext>
-          </a:extLst>
-        </p:cNvPr>
-        <p:cNvGrpSpPr/>
-        <p:nvPr/>
-      </p:nvGrpSpPr>
-      <p:grpSpPr>
-        <a:xfrm>
-          <a:off x="0" y="0"/>
-          <a:ext cx="0" cy="0"/>
-          <a:chOff x="0" y="0"/>
-          <a:chExt cx="0" cy="0"/>
-        </a:xfrm>
-      </p:grpSpPr>
-      <p:sp>
-        <p:nvSpPr>
-          <p:cNvPr id="2" name="Slide Image Placeholder 1">
-            <a:extLst>
-              <a:ext uri="{FF2B5EF4-FFF2-40B4-BE49-F238E27FC236}">
-                <a16:creationId xmlns:a16="http://schemas.microsoft.com/office/drawing/2014/main" id="{58674EAD-35E6-891A-9344-0DFA3659A3A9}"/>
-              </a:ext>
-            </a:extLst>
-          </p:cNvPr>
-          <p:cNvSpPr>
-            <a:spLocks noGrp="1" noRot="1" noChangeAspect="1"/>
-          </p:cNvSpPr>
-          <p:nvPr>
-            <p:ph type="sldImg"/>
-          </p:nvPr>
-        </p:nvSpPr>
-        <p:spPr/>
-      </p:sp>
-      <p:sp>
-        <p:nvSpPr>
-          <p:cNvPr id="3" name="Notes Placeholder 2">
-            <a:extLst>
-              <a:ext uri="{FF2B5EF4-FFF2-40B4-BE49-F238E27FC236}">
-                <a16:creationId xmlns:a16="http://schemas.microsoft.com/office/drawing/2014/main" id="{D7DB15F6-2395-E45B-06A8-821B7E23F433}"/>
-              </a:ext>
-            </a:extLst>
-          </p:cNvPr>
-          <p:cNvSpPr>
-            <a:spLocks noGrp="1"/>
-          </p:cNvSpPr>
-          <p:nvPr>
-            <p:ph type="body" idx="1"/>
-          </p:nvPr>
-        </p:nvSpPr>
-        <p:spPr/>
-        <p:txBody>
-          <a:bodyPr/>
-          <a:lstStyle/>
-          <a:p>
-            <a:pPr marL="0" marR="0" lvl="0" indent="0" algn="l" defTabSz="914400" rtl="0" eaLnBrk="1" fontAlgn="auto" latinLnBrk="0" hangingPunct="1">
-              <a:lnSpc>
-                <a:spcPct val="100000"/>
-              </a:lnSpc>
-              <a:spcBef>
-                <a:spcPts val="0"/>
-              </a:spcBef>
-              <a:spcAft>
-                <a:spcPts val="0"/>
-              </a:spcAft>
-              <a:buClrTx/>
-              <a:buSzTx/>
-              <a:buFontTx/>
-              <a:buNone/>
-              <a:tabLst/>
-              <a:defRPr/>
-            </a:pPr>
-            <a:endParaRPr lang="nl-NL" dirty="0"/>
-          </a:p>
-        </p:txBody>
-      </p:sp>
-      <p:sp>
-        <p:nvSpPr>
-          <p:cNvPr id="4" name="Slide Number Placeholder 3">
-            <a:extLst>
-              <a:ext uri="{FF2B5EF4-FFF2-40B4-BE49-F238E27FC236}">
-                <a16:creationId xmlns:a16="http://schemas.microsoft.com/office/drawing/2014/main" id="{A13FDDBE-964B-C649-C4BA-960A55793527}"/>
-              </a:ext>
-            </a:extLst>
-          </p:cNvPr>
-          <p:cNvSpPr>
-            <a:spLocks noGrp="1"/>
-          </p:cNvSpPr>
-          <p:nvPr>
-            <p:ph type="sldNum" sz="quarter" idx="5"/>
-          </p:nvPr>
-        </p:nvSpPr>
-        <p:spPr/>
-        <p:txBody>
-          <a:bodyPr/>
-          <a:lstStyle/>
-          <a:p>
-            <a:fld id="{4BAF0DEA-1372-46C0-8FC9-2869E9CCF7DA}" type="slidenum">
-              <a:rPr lang="en-NL" smtClean="0"/>
-              <a:t>53</a:t>
-            </a:fld>
-            <a:endParaRPr lang="en-NL"/>
-          </a:p>
-        </p:txBody>
-      </p:sp>
-    </p:spTree>
-    <p:extLst>
-      <p:ext uri="{BB962C8B-B14F-4D97-AF65-F5344CB8AC3E}">
-        <p14:creationId xmlns:p14="http://schemas.microsoft.com/office/powerpoint/2010/main" val="240142702"/>
       </p:ext>
     </p:extLst>
   </p:cSld>
@@ -3297,6 +3288,131 @@
         <p:cNvPr id="1" name="">
           <a:extLst>
             <a:ext uri="{FF2B5EF4-FFF2-40B4-BE49-F238E27FC236}">
+              <a16:creationId xmlns:a16="http://schemas.microsoft.com/office/drawing/2014/main" id="{45876175-95F1-BB96-2A19-C19D57211E2C}"/>
+            </a:ext>
+          </a:extLst>
+        </p:cNvPr>
+        <p:cNvGrpSpPr/>
+        <p:nvPr/>
+      </p:nvGrpSpPr>
+      <p:grpSpPr>
+        <a:xfrm>
+          <a:off x="0" y="0"/>
+          <a:ext cx="0" cy="0"/>
+          <a:chOff x="0" y="0"/>
+          <a:chExt cx="0" cy="0"/>
+        </a:xfrm>
+      </p:grpSpPr>
+      <p:sp>
+        <p:nvSpPr>
+          <p:cNvPr id="2" name="Slide Image Placeholder 1">
+            <a:extLst>
+              <a:ext uri="{FF2B5EF4-FFF2-40B4-BE49-F238E27FC236}">
+                <a16:creationId xmlns:a16="http://schemas.microsoft.com/office/drawing/2014/main" id="{58674EAD-35E6-891A-9344-0DFA3659A3A9}"/>
+              </a:ext>
+            </a:extLst>
+          </p:cNvPr>
+          <p:cNvSpPr>
+            <a:spLocks noGrp="1" noRot="1" noChangeAspect="1"/>
+          </p:cNvSpPr>
+          <p:nvPr>
+            <p:ph type="sldImg"/>
+          </p:nvPr>
+        </p:nvSpPr>
+        <p:spPr/>
+      </p:sp>
+      <p:sp>
+        <p:nvSpPr>
+          <p:cNvPr id="3" name="Notes Placeholder 2">
+            <a:extLst>
+              <a:ext uri="{FF2B5EF4-FFF2-40B4-BE49-F238E27FC236}">
+                <a16:creationId xmlns:a16="http://schemas.microsoft.com/office/drawing/2014/main" id="{D7DB15F6-2395-E45B-06A8-821B7E23F433}"/>
+              </a:ext>
+            </a:extLst>
+          </p:cNvPr>
+          <p:cNvSpPr>
+            <a:spLocks noGrp="1"/>
+          </p:cNvSpPr>
+          <p:nvPr>
+            <p:ph type="body" idx="1"/>
+          </p:nvPr>
+        </p:nvSpPr>
+        <p:spPr/>
+        <p:txBody>
+          <a:bodyPr/>
+          <a:lstStyle/>
+          <a:p>
+            <a:pPr marL="0" marR="0" lvl="0" indent="0" algn="l" defTabSz="914400" rtl="0" eaLnBrk="1" fontAlgn="auto" latinLnBrk="0" hangingPunct="1">
+              <a:lnSpc>
+                <a:spcPct val="100000"/>
+              </a:lnSpc>
+              <a:spcBef>
+                <a:spcPts val="0"/>
+              </a:spcBef>
+              <a:spcAft>
+                <a:spcPts val="0"/>
+              </a:spcAft>
+              <a:buClrTx/>
+              <a:buSzTx/>
+              <a:buFontTx/>
+              <a:buNone/>
+              <a:tabLst/>
+              <a:defRPr/>
+            </a:pPr>
+            <a:endParaRPr lang="nl-NL" dirty="0"/>
+          </a:p>
+        </p:txBody>
+      </p:sp>
+      <p:sp>
+        <p:nvSpPr>
+          <p:cNvPr id="4" name="Slide Number Placeholder 3">
+            <a:extLst>
+              <a:ext uri="{FF2B5EF4-FFF2-40B4-BE49-F238E27FC236}">
+                <a16:creationId xmlns:a16="http://schemas.microsoft.com/office/drawing/2014/main" id="{A13FDDBE-964B-C649-C4BA-960A55793527}"/>
+              </a:ext>
+            </a:extLst>
+          </p:cNvPr>
+          <p:cNvSpPr>
+            <a:spLocks noGrp="1"/>
+          </p:cNvSpPr>
+          <p:nvPr>
+            <p:ph type="sldNum" sz="quarter" idx="5"/>
+          </p:nvPr>
+        </p:nvSpPr>
+        <p:spPr/>
+        <p:txBody>
+          <a:bodyPr/>
+          <a:lstStyle/>
+          <a:p>
+            <a:fld id="{4BAF0DEA-1372-46C0-8FC9-2869E9CCF7DA}" type="slidenum">
+              <a:rPr lang="en-NL" smtClean="0"/>
+              <a:t>53</a:t>
+            </a:fld>
+            <a:endParaRPr lang="en-NL"/>
+          </a:p>
+        </p:txBody>
+      </p:sp>
+    </p:spTree>
+    <p:extLst>
+      <p:ext uri="{BB962C8B-B14F-4D97-AF65-F5344CB8AC3E}">
+        <p14:creationId xmlns:p14="http://schemas.microsoft.com/office/powerpoint/2010/main" val="240142702"/>
+      </p:ext>
+    </p:extLst>
+  </p:cSld>
+  <p:clrMapOvr>
+    <a:masterClrMapping/>
+  </p:clrMapOvr>
+</p:notes>
+</file>
+
+<file path=ppt/notesSlides/notesSlide31.xml><?xml version="1.0" encoding="utf-8"?>
+<p:notes xmlns:a="http://schemas.openxmlformats.org/drawingml/2006/main" xmlns:r="http://schemas.openxmlformats.org/officeDocument/2006/relationships" xmlns:p="http://schemas.openxmlformats.org/presentationml/2006/main">
+  <p:cSld>
+    <p:spTree>
+      <p:nvGrpSpPr>
+        <p:cNvPr id="1" name="">
+          <a:extLst>
+            <a:ext uri="{FF2B5EF4-FFF2-40B4-BE49-F238E27FC236}">
               <a16:creationId xmlns:a16="http://schemas.microsoft.com/office/drawing/2014/main" id="{6E1701FD-E61C-07B4-3253-55BBD7068F2D}"/>
             </a:ext>
           </a:extLst>
@@ -3414,7 +3530,7 @@
 </p:notes>
 </file>
 
-<file path=ppt/notesSlides/notesSlide31.xml><?xml version="1.0" encoding="utf-8"?>
+<file path=ppt/notesSlides/notesSlide32.xml><?xml version="1.0" encoding="utf-8"?>
 <p:notes xmlns:a="http://schemas.openxmlformats.org/drawingml/2006/main" xmlns:r="http://schemas.openxmlformats.org/officeDocument/2006/relationships" xmlns:p="http://schemas.openxmlformats.org/presentationml/2006/main">
   <p:cSld>
     <p:spTree>
@@ -3493,6 +3609,14 @@
               <a:tabLst/>
               <a:defRPr/>
             </a:pPr>
+            <a:r>
+              <a:rPr lang="nl-NL" dirty="0"/>
+              <a:t>Demo: AD: </a:t>
+            </a:r>
+            <a:r>
+              <a:rPr lang="nl-NL" dirty="0" err="1"/>
+              <a:t>pipelines</a:t>
+            </a:r>
             <a:endParaRPr lang="nl-NL" dirty="0"/>
           </a:p>
         </p:txBody>
@@ -3539,7 +3663,7 @@
 </p:notes>
 </file>
 
-<file path=ppt/notesSlides/notesSlide32.xml><?xml version="1.0" encoding="utf-8"?>
+<file path=ppt/notesSlides/notesSlide33.xml><?xml version="1.0" encoding="utf-8"?>
 <p:notes xmlns:a="http://schemas.openxmlformats.org/drawingml/2006/main" xmlns:r="http://schemas.openxmlformats.org/officeDocument/2006/relationships" xmlns:p="http://schemas.openxmlformats.org/presentationml/2006/main">
   <p:cSld>
     <p:spTree>
@@ -3664,7 +3788,7 @@
 </p:notes>
 </file>
 
-<file path=ppt/notesSlides/notesSlide33.xml><?xml version="1.0" encoding="utf-8"?>
+<file path=ppt/notesSlides/notesSlide34.xml><?xml version="1.0" encoding="utf-8"?>
 <p:notes xmlns:a="http://schemas.openxmlformats.org/drawingml/2006/main" xmlns:r="http://schemas.openxmlformats.org/officeDocument/2006/relationships" xmlns:p="http://schemas.openxmlformats.org/presentationml/2006/main">
   <p:cSld>
     <p:spTree>
@@ -3743,6 +3867,22 @@
               <a:tabLst/>
               <a:defRPr/>
             </a:pPr>
+            <a:r>
+              <a:rPr lang="nl-NL" dirty="0"/>
+              <a:t>Demo: AD: </a:t>
+            </a:r>
+            <a:r>
+              <a:rPr lang="nl-NL" dirty="0" err="1"/>
+              <a:t>branch</a:t>
+            </a:r>
+            <a:r>
+              <a:rPr lang="nl-NL" dirty="0"/>
+              <a:t> </a:t>
+            </a:r>
+            <a:r>
+              <a:rPr lang="nl-NL" dirty="0" err="1"/>
+              <a:t>policies</a:t>
+            </a:r>
             <a:endParaRPr lang="nl-NL" dirty="0"/>
           </a:p>
         </p:txBody>
@@ -3780,6 +3920,101 @@
     <p:extLst>
       <p:ext uri="{BB962C8B-B14F-4D97-AF65-F5344CB8AC3E}">
         <p14:creationId xmlns:p14="http://schemas.microsoft.com/office/powerpoint/2010/main" val="2324099028"/>
+      </p:ext>
+    </p:extLst>
+  </p:cSld>
+  <p:clrMapOvr>
+    <a:masterClrMapping/>
+  </p:clrMapOvr>
+</p:notes>
+</file>
+
+<file path=ppt/notesSlides/notesSlide35.xml><?xml version="1.0" encoding="utf-8"?>
+<p:notes xmlns:a="http://schemas.openxmlformats.org/drawingml/2006/main" xmlns:r="http://schemas.openxmlformats.org/officeDocument/2006/relationships" xmlns:p="http://schemas.openxmlformats.org/presentationml/2006/main">
+  <p:cSld>
+    <p:spTree>
+      <p:nvGrpSpPr>
+        <p:cNvPr id="1" name=""/>
+        <p:cNvGrpSpPr/>
+        <p:nvPr/>
+      </p:nvGrpSpPr>
+      <p:grpSpPr>
+        <a:xfrm>
+          <a:off x="0" y="0"/>
+          <a:ext cx="0" cy="0"/>
+          <a:chOff x="0" y="0"/>
+          <a:chExt cx="0" cy="0"/>
+        </a:xfrm>
+      </p:grpSpPr>
+      <p:sp>
+        <p:nvSpPr>
+          <p:cNvPr id="2" name="Slide Image Placeholder 1"/>
+          <p:cNvSpPr>
+            <a:spLocks noGrp="1" noRot="1" noChangeAspect="1"/>
+          </p:cNvSpPr>
+          <p:nvPr>
+            <p:ph type="sldImg"/>
+          </p:nvPr>
+        </p:nvSpPr>
+        <p:spPr/>
+      </p:sp>
+      <p:sp>
+        <p:nvSpPr>
+          <p:cNvPr id="3" name="Notes Placeholder 2"/>
+          <p:cNvSpPr>
+            <a:spLocks noGrp="1"/>
+          </p:cNvSpPr>
+          <p:nvPr>
+            <p:ph type="body" idx="1"/>
+          </p:nvPr>
+        </p:nvSpPr>
+        <p:spPr/>
+        <p:txBody>
+          <a:bodyPr/>
+          <a:lstStyle/>
+          <a:p>
+            <a:r>
+              <a:rPr lang="nl-NL" dirty="0"/>
+              <a:t>Demo: AD: </a:t>
+            </a:r>
+            <a:r>
+              <a:rPr lang="nl-NL" dirty="0" err="1"/>
+              <a:t>work</a:t>
+            </a:r>
+            <a:r>
+              <a:rPr lang="nl-NL" dirty="0"/>
+              <a:t> items.</a:t>
+            </a:r>
+          </a:p>
+        </p:txBody>
+      </p:sp>
+      <p:sp>
+        <p:nvSpPr>
+          <p:cNvPr id="4" name="Slide Number Placeholder 3"/>
+          <p:cNvSpPr>
+            <a:spLocks noGrp="1"/>
+          </p:cNvSpPr>
+          <p:nvPr>
+            <p:ph type="sldNum" sz="quarter" idx="5"/>
+          </p:nvPr>
+        </p:nvSpPr>
+        <p:spPr/>
+        <p:txBody>
+          <a:bodyPr/>
+          <a:lstStyle/>
+          <a:p>
+            <a:fld id="{4BAF0DEA-1372-46C0-8FC9-2869E9CCF7DA}" type="slidenum">
+              <a:rPr lang="en-NL" smtClean="0"/>
+              <a:t>62</a:t>
+            </a:fld>
+            <a:endParaRPr lang="en-NL"/>
+          </a:p>
+        </p:txBody>
+      </p:sp>
+    </p:spTree>
+    <p:extLst>
+      <p:ext uri="{BB962C8B-B14F-4D97-AF65-F5344CB8AC3E}">
+        <p14:creationId xmlns:p14="http://schemas.microsoft.com/office/powerpoint/2010/main" val="1276367604"/>
       </p:ext>
     </p:extLst>
   </p:cSld>
@@ -22165,6 +22400,1116 @@
         <p:cNvPr id="1" name="">
           <a:extLst>
             <a:ext uri="{FF2B5EF4-FFF2-40B4-BE49-F238E27FC236}">
+              <a16:creationId xmlns:a16="http://schemas.microsoft.com/office/drawing/2014/main" id="{BDFEA8A2-09C3-6C8E-58C3-68AE93B47193}"/>
+            </a:ext>
+          </a:extLst>
+        </p:cNvPr>
+        <p:cNvGrpSpPr/>
+        <p:nvPr/>
+      </p:nvGrpSpPr>
+      <p:grpSpPr>
+        <a:xfrm>
+          <a:off x="0" y="0"/>
+          <a:ext cx="0" cy="0"/>
+          <a:chOff x="0" y="0"/>
+          <a:chExt cx="0" cy="0"/>
+        </a:xfrm>
+      </p:grpSpPr>
+      <p:sp>
+        <p:nvSpPr>
+          <p:cNvPr id="2" name="Title 1">
+            <a:extLst>
+              <a:ext uri="{FF2B5EF4-FFF2-40B4-BE49-F238E27FC236}">
+                <a16:creationId xmlns:a16="http://schemas.microsoft.com/office/drawing/2014/main" id="{93B18F6F-5175-8AA3-408E-E13768652827}"/>
+              </a:ext>
+            </a:extLst>
+          </p:cNvPr>
+          <p:cNvSpPr>
+            <a:spLocks noGrp="1"/>
+          </p:cNvSpPr>
+          <p:nvPr>
+            <p:ph type="title"/>
+          </p:nvPr>
+        </p:nvSpPr>
+        <p:spPr>
+          <a:xfrm>
+            <a:off x="838200" y="365126"/>
+            <a:ext cx="10515600" cy="718608"/>
+          </a:xfrm>
+        </p:spPr>
+        <p:txBody>
+          <a:bodyPr>
+            <a:normAutofit/>
+          </a:bodyPr>
+          <a:lstStyle/>
+          <a:p>
+            <a:r>
+              <a:rPr lang="nl-NL" sz="3600" noProof="0" dirty="0"/>
+              <a:t>Issue aanmaken</a:t>
+            </a:r>
+          </a:p>
+        </p:txBody>
+      </p:sp>
+      <p:sp>
+        <p:nvSpPr>
+          <p:cNvPr id="15" name="Content Placeholder 2">
+            <a:extLst>
+              <a:ext uri="{FF2B5EF4-FFF2-40B4-BE49-F238E27FC236}">
+                <a16:creationId xmlns:a16="http://schemas.microsoft.com/office/drawing/2014/main" id="{4DCBF055-7428-2021-44E2-CCD550754DA2}"/>
+              </a:ext>
+            </a:extLst>
+          </p:cNvPr>
+          <p:cNvSpPr txBox="1">
+            <a:spLocks/>
+          </p:cNvSpPr>
+          <p:nvPr/>
+        </p:nvSpPr>
+        <p:spPr>
+          <a:xfrm>
+            <a:off x="838199" y="1456267"/>
+            <a:ext cx="3312319" cy="4720696"/>
+          </a:xfrm>
+          <a:prstGeom prst="rect">
+            <a:avLst/>
+          </a:prstGeom>
+        </p:spPr>
+        <p:txBody>
+          <a:bodyPr vert="horz" lIns="91440" tIns="45720" rIns="91440" bIns="45720" rtlCol="0">
+            <a:noAutofit/>
+          </a:bodyPr>
+          <a:lstStyle>
+            <a:lvl1pPr marL="228600" indent="-228600" algn="l" defTabSz="914400" rtl="0" eaLnBrk="1" latinLnBrk="0" hangingPunct="1">
+              <a:lnSpc>
+                <a:spcPct val="90000"/>
+              </a:lnSpc>
+              <a:spcBef>
+                <a:spcPts val="1000"/>
+              </a:spcBef>
+              <a:buFont typeface="Arial" panose="020B0604020202020204" pitchFamily="34" charset="0"/>
+              <a:buChar char="•"/>
+              <a:defRPr sz="2800" kern="1200">
+                <a:solidFill>
+                  <a:schemeClr val="tx1"/>
+                </a:solidFill>
+                <a:latin typeface="+mn-lt"/>
+                <a:ea typeface="+mn-ea"/>
+                <a:cs typeface="+mn-cs"/>
+              </a:defRPr>
+            </a:lvl1pPr>
+            <a:lvl2pPr marL="685800" indent="-228600" algn="l" defTabSz="914400" rtl="0" eaLnBrk="1" latinLnBrk="0" hangingPunct="1">
+              <a:lnSpc>
+                <a:spcPct val="90000"/>
+              </a:lnSpc>
+              <a:spcBef>
+                <a:spcPts val="500"/>
+              </a:spcBef>
+              <a:buFont typeface="Arial" panose="020B0604020202020204" pitchFamily="34" charset="0"/>
+              <a:buChar char="•"/>
+              <a:defRPr sz="2400" kern="1200">
+                <a:solidFill>
+                  <a:schemeClr val="tx1"/>
+                </a:solidFill>
+                <a:latin typeface="+mn-lt"/>
+                <a:ea typeface="+mn-ea"/>
+                <a:cs typeface="+mn-cs"/>
+              </a:defRPr>
+            </a:lvl2pPr>
+            <a:lvl3pPr marL="1143000" indent="-228600" algn="l" defTabSz="914400" rtl="0" eaLnBrk="1" latinLnBrk="0" hangingPunct="1">
+              <a:lnSpc>
+                <a:spcPct val="90000"/>
+              </a:lnSpc>
+              <a:spcBef>
+                <a:spcPts val="500"/>
+              </a:spcBef>
+              <a:buFont typeface="Arial" panose="020B0604020202020204" pitchFamily="34" charset="0"/>
+              <a:buChar char="•"/>
+              <a:defRPr sz="2000" kern="1200">
+                <a:solidFill>
+                  <a:schemeClr val="tx1"/>
+                </a:solidFill>
+                <a:latin typeface="+mn-lt"/>
+                <a:ea typeface="+mn-ea"/>
+                <a:cs typeface="+mn-cs"/>
+              </a:defRPr>
+            </a:lvl3pPr>
+            <a:lvl4pPr marL="1600200" indent="-228600" algn="l" defTabSz="914400" rtl="0" eaLnBrk="1" latinLnBrk="0" hangingPunct="1">
+              <a:lnSpc>
+                <a:spcPct val="90000"/>
+              </a:lnSpc>
+              <a:spcBef>
+                <a:spcPts val="500"/>
+              </a:spcBef>
+              <a:buFont typeface="Arial" panose="020B0604020202020204" pitchFamily="34" charset="0"/>
+              <a:buChar char="•"/>
+              <a:defRPr sz="1800" kern="1200">
+                <a:solidFill>
+                  <a:schemeClr val="tx1"/>
+                </a:solidFill>
+                <a:latin typeface="+mn-lt"/>
+                <a:ea typeface="+mn-ea"/>
+                <a:cs typeface="+mn-cs"/>
+              </a:defRPr>
+            </a:lvl4pPr>
+            <a:lvl5pPr marL="2057400" indent="-228600" algn="l" defTabSz="914400" rtl="0" eaLnBrk="1" latinLnBrk="0" hangingPunct="1">
+              <a:lnSpc>
+                <a:spcPct val="90000"/>
+              </a:lnSpc>
+              <a:spcBef>
+                <a:spcPts val="500"/>
+              </a:spcBef>
+              <a:buFont typeface="Arial" panose="020B0604020202020204" pitchFamily="34" charset="0"/>
+              <a:buChar char="•"/>
+              <a:defRPr sz="1800" kern="1200">
+                <a:solidFill>
+                  <a:schemeClr val="tx1"/>
+                </a:solidFill>
+                <a:latin typeface="+mn-lt"/>
+                <a:ea typeface="+mn-ea"/>
+                <a:cs typeface="+mn-cs"/>
+              </a:defRPr>
+            </a:lvl5pPr>
+            <a:lvl6pPr marL="2514600" indent="-228600" algn="l" defTabSz="914400" rtl="0" eaLnBrk="1" latinLnBrk="0" hangingPunct="1">
+              <a:lnSpc>
+                <a:spcPct val="90000"/>
+              </a:lnSpc>
+              <a:spcBef>
+                <a:spcPts val="500"/>
+              </a:spcBef>
+              <a:buFont typeface="Arial" panose="020B0604020202020204" pitchFamily="34" charset="0"/>
+              <a:buChar char="•"/>
+              <a:defRPr sz="1800" kern="1200">
+                <a:solidFill>
+                  <a:schemeClr val="tx1"/>
+                </a:solidFill>
+                <a:latin typeface="+mn-lt"/>
+                <a:ea typeface="+mn-ea"/>
+                <a:cs typeface="+mn-cs"/>
+              </a:defRPr>
+            </a:lvl6pPr>
+            <a:lvl7pPr marL="2971800" indent="-228600" algn="l" defTabSz="914400" rtl="0" eaLnBrk="1" latinLnBrk="0" hangingPunct="1">
+              <a:lnSpc>
+                <a:spcPct val="90000"/>
+              </a:lnSpc>
+              <a:spcBef>
+                <a:spcPts val="500"/>
+              </a:spcBef>
+              <a:buFont typeface="Arial" panose="020B0604020202020204" pitchFamily="34" charset="0"/>
+              <a:buChar char="•"/>
+              <a:defRPr sz="1800" kern="1200">
+                <a:solidFill>
+                  <a:schemeClr val="tx1"/>
+                </a:solidFill>
+                <a:latin typeface="+mn-lt"/>
+                <a:ea typeface="+mn-ea"/>
+                <a:cs typeface="+mn-cs"/>
+              </a:defRPr>
+            </a:lvl7pPr>
+            <a:lvl8pPr marL="3429000" indent="-228600" algn="l" defTabSz="914400" rtl="0" eaLnBrk="1" latinLnBrk="0" hangingPunct="1">
+              <a:lnSpc>
+                <a:spcPct val="90000"/>
+              </a:lnSpc>
+              <a:spcBef>
+                <a:spcPts val="500"/>
+              </a:spcBef>
+              <a:buFont typeface="Arial" panose="020B0604020202020204" pitchFamily="34" charset="0"/>
+              <a:buChar char="•"/>
+              <a:defRPr sz="1800" kern="1200">
+                <a:solidFill>
+                  <a:schemeClr val="tx1"/>
+                </a:solidFill>
+                <a:latin typeface="+mn-lt"/>
+                <a:ea typeface="+mn-ea"/>
+                <a:cs typeface="+mn-cs"/>
+              </a:defRPr>
+            </a:lvl8pPr>
+            <a:lvl9pPr marL="3886200" indent="-228600" algn="l" defTabSz="914400" rtl="0" eaLnBrk="1" latinLnBrk="0" hangingPunct="1">
+              <a:lnSpc>
+                <a:spcPct val="90000"/>
+              </a:lnSpc>
+              <a:spcBef>
+                <a:spcPts val="500"/>
+              </a:spcBef>
+              <a:buFont typeface="Arial" panose="020B0604020202020204" pitchFamily="34" charset="0"/>
+              <a:buChar char="•"/>
+              <a:defRPr sz="1800" kern="1200">
+                <a:solidFill>
+                  <a:schemeClr val="tx1"/>
+                </a:solidFill>
+                <a:latin typeface="+mn-lt"/>
+                <a:ea typeface="+mn-ea"/>
+                <a:cs typeface="+mn-cs"/>
+              </a:defRPr>
+            </a:lvl9pPr>
+          </a:lstStyle>
+          <a:p>
+            <a:pPr marL="0" indent="0">
+              <a:lnSpc>
+                <a:spcPct val="100000"/>
+              </a:lnSpc>
+              <a:spcBef>
+                <a:spcPts val="600"/>
+              </a:spcBef>
+              <a:buFont typeface="Arial" panose="020B0604020202020204" pitchFamily="34" charset="0"/>
+              <a:buNone/>
+            </a:pPr>
+            <a:r>
+              <a:rPr lang="nl-NL" sz="1400" b="1" dirty="0"/>
+              <a:t>Wat is een issue?</a:t>
+            </a:r>
+          </a:p>
+          <a:p>
+            <a:pPr marL="0" indent="0">
+              <a:lnSpc>
+                <a:spcPct val="100000"/>
+              </a:lnSpc>
+              <a:spcBef>
+                <a:spcPts val="600"/>
+              </a:spcBef>
+              <a:buFont typeface="Arial" panose="020B0604020202020204" pitchFamily="34" charset="0"/>
+              <a:buNone/>
+            </a:pPr>
+            <a:r>
+              <a:rPr lang="nl-NL" sz="1400" dirty="0"/>
+              <a:t>Een taak / concreet stukje werk.</a:t>
+            </a:r>
+            <a:endParaRPr lang="nl-NL" sz="1400" b="1" dirty="0"/>
+          </a:p>
+          <a:p>
+            <a:pPr marL="0" indent="0">
+              <a:lnSpc>
+                <a:spcPct val="100000"/>
+              </a:lnSpc>
+              <a:spcBef>
+                <a:spcPts val="600"/>
+              </a:spcBef>
+              <a:buFont typeface="Arial" panose="020B0604020202020204" pitchFamily="34" charset="0"/>
+              <a:buNone/>
+            </a:pPr>
+            <a:endParaRPr lang="nl-NL" sz="1400" b="1" dirty="0"/>
+          </a:p>
+          <a:p>
+            <a:pPr marL="0" indent="0">
+              <a:lnSpc>
+                <a:spcPct val="100000"/>
+              </a:lnSpc>
+              <a:spcBef>
+                <a:spcPts val="600"/>
+              </a:spcBef>
+              <a:buFont typeface="Arial" panose="020B0604020202020204" pitchFamily="34" charset="0"/>
+              <a:buNone/>
+            </a:pPr>
+            <a:r>
+              <a:rPr lang="nl-NL" sz="1400" b="1" dirty="0"/>
+              <a:t>Aanmaken via repository:</a:t>
+            </a:r>
+          </a:p>
+          <a:p>
+            <a:pPr>
+              <a:lnSpc>
+                <a:spcPct val="100000"/>
+              </a:lnSpc>
+              <a:spcBef>
+                <a:spcPts val="600"/>
+              </a:spcBef>
+              <a:buFontTx/>
+              <a:buChar char="-"/>
+            </a:pPr>
+            <a:endParaRPr lang="nl-NL" sz="1400" dirty="0"/>
+          </a:p>
+          <a:p>
+            <a:pPr>
+              <a:lnSpc>
+                <a:spcPct val="100000"/>
+              </a:lnSpc>
+              <a:spcBef>
+                <a:spcPts val="600"/>
+              </a:spcBef>
+              <a:buFontTx/>
+              <a:buChar char="-"/>
+            </a:pPr>
+            <a:r>
+              <a:rPr lang="nl-NL" sz="1400" dirty="0"/>
+              <a:t>Ga naar een repository.</a:t>
+            </a:r>
+          </a:p>
+          <a:p>
+            <a:pPr>
+              <a:lnSpc>
+                <a:spcPct val="100000"/>
+              </a:lnSpc>
+              <a:spcBef>
+                <a:spcPts val="600"/>
+              </a:spcBef>
+              <a:buFontTx/>
+              <a:buChar char="-"/>
+            </a:pPr>
+            <a:r>
+              <a:rPr lang="nl-NL" sz="1400" dirty="0"/>
+              <a:t>Klik bovenaan op Issues.</a:t>
+            </a:r>
+          </a:p>
+          <a:p>
+            <a:pPr>
+              <a:lnSpc>
+                <a:spcPct val="100000"/>
+              </a:lnSpc>
+              <a:spcBef>
+                <a:spcPts val="600"/>
+              </a:spcBef>
+              <a:buFontTx/>
+              <a:buChar char="-"/>
+            </a:pPr>
+            <a:r>
+              <a:rPr lang="nl-NL" sz="1400" dirty="0"/>
+              <a:t>Klik rechtsboven op New Issue.</a:t>
+            </a:r>
+          </a:p>
+          <a:p>
+            <a:pPr>
+              <a:lnSpc>
+                <a:spcPct val="100000"/>
+              </a:lnSpc>
+              <a:spcBef>
+                <a:spcPts val="600"/>
+              </a:spcBef>
+              <a:buFontTx/>
+              <a:buChar char="-"/>
+            </a:pPr>
+            <a:r>
+              <a:rPr lang="nl-NL" sz="1400" dirty="0"/>
+              <a:t>Vul alle gegevens in.</a:t>
+            </a:r>
+          </a:p>
+          <a:p>
+            <a:pPr>
+              <a:lnSpc>
+                <a:spcPct val="100000"/>
+              </a:lnSpc>
+              <a:spcBef>
+                <a:spcPts val="600"/>
+              </a:spcBef>
+              <a:buFontTx/>
+              <a:buChar char="-"/>
+            </a:pPr>
+            <a:r>
+              <a:rPr lang="nl-NL" sz="1400" dirty="0"/>
+              <a:t>Kies project in rechter menu</a:t>
+            </a:r>
+          </a:p>
+          <a:p>
+            <a:pPr marL="0" indent="0">
+              <a:lnSpc>
+                <a:spcPct val="100000"/>
+              </a:lnSpc>
+              <a:spcBef>
+                <a:spcPts val="600"/>
+              </a:spcBef>
+              <a:buNone/>
+            </a:pPr>
+            <a:endParaRPr lang="nl-NL" sz="1400" dirty="0"/>
+          </a:p>
+          <a:p>
+            <a:pPr marL="0" indent="0">
+              <a:lnSpc>
+                <a:spcPct val="100000"/>
+              </a:lnSpc>
+              <a:spcBef>
+                <a:spcPts val="600"/>
+              </a:spcBef>
+              <a:buNone/>
+            </a:pPr>
+            <a:endParaRPr lang="nl-NL" sz="1400" dirty="0"/>
+          </a:p>
+          <a:p>
+            <a:pPr marL="0" indent="0">
+              <a:lnSpc>
+                <a:spcPct val="100000"/>
+              </a:lnSpc>
+              <a:spcBef>
+                <a:spcPts val="600"/>
+              </a:spcBef>
+              <a:buFont typeface="Arial" panose="020B0604020202020204" pitchFamily="34" charset="0"/>
+              <a:buNone/>
+            </a:pPr>
+            <a:endParaRPr lang="nl-NL" sz="1400" dirty="0"/>
+          </a:p>
+        </p:txBody>
+      </p:sp>
+      <p:pic>
+        <p:nvPicPr>
+          <p:cNvPr id="4" name="Picture 3" descr="A screenshot of a computer&#10;&#10;Description automatically generated">
+            <a:extLst>
+              <a:ext uri="{FF2B5EF4-FFF2-40B4-BE49-F238E27FC236}">
+                <a16:creationId xmlns:a16="http://schemas.microsoft.com/office/drawing/2014/main" id="{336BBA03-D9DD-D985-58E3-1D280C65BF79}"/>
+              </a:ext>
+            </a:extLst>
+          </p:cNvPr>
+          <p:cNvPicPr>
+            <a:picLocks noChangeAspect="1"/>
+          </p:cNvPicPr>
+          <p:nvPr/>
+        </p:nvPicPr>
+        <p:blipFill>
+          <a:blip r:embed="rId3">
+            <a:extLst>
+              <a:ext uri="{28A0092B-C50C-407E-A947-70E740481C1C}">
+                <a14:useLocalDpi xmlns:a14="http://schemas.microsoft.com/office/drawing/2010/main" val="0"/>
+              </a:ext>
+            </a:extLst>
+          </a:blip>
+          <a:stretch>
+            <a:fillRect/>
+          </a:stretch>
+        </p:blipFill>
+        <p:spPr>
+          <a:xfrm>
+            <a:off x="4488300" y="1456267"/>
+            <a:ext cx="6865500" cy="3003656"/>
+          </a:xfrm>
+          <a:prstGeom prst="rect">
+            <a:avLst/>
+          </a:prstGeom>
+          <a:ln>
+            <a:solidFill>
+              <a:schemeClr val="tx1"/>
+            </a:solidFill>
+          </a:ln>
+        </p:spPr>
+      </p:pic>
+      <p:sp>
+        <p:nvSpPr>
+          <p:cNvPr id="6" name="Rectangle 5">
+            <a:extLst>
+              <a:ext uri="{FF2B5EF4-FFF2-40B4-BE49-F238E27FC236}">
+                <a16:creationId xmlns:a16="http://schemas.microsoft.com/office/drawing/2014/main" id="{78D13A21-0E8F-2EB0-324B-512B504F9D81}"/>
+              </a:ext>
+            </a:extLst>
+          </p:cNvPr>
+          <p:cNvSpPr/>
+          <p:nvPr/>
+        </p:nvSpPr>
+        <p:spPr>
+          <a:xfrm>
+            <a:off x="9555480" y="2429691"/>
+            <a:ext cx="1737360" cy="1208315"/>
+          </a:xfrm>
+          <a:prstGeom prst="rect">
+            <a:avLst/>
+          </a:prstGeom>
+          <a:noFill/>
+          <a:ln w="12700">
+            <a:solidFill>
+              <a:schemeClr val="accent2"/>
+            </a:solidFill>
+          </a:ln>
+        </p:spPr>
+        <p:style>
+          <a:lnRef idx="2">
+            <a:schemeClr val="accent1">
+              <a:shade val="15000"/>
+            </a:schemeClr>
+          </a:lnRef>
+          <a:fillRef idx="1">
+            <a:schemeClr val="accent1"/>
+          </a:fillRef>
+          <a:effectRef idx="0">
+            <a:schemeClr val="accent1"/>
+          </a:effectRef>
+          <a:fontRef idx="minor">
+            <a:schemeClr val="lt1"/>
+          </a:fontRef>
+        </p:style>
+        <p:txBody>
+          <a:bodyPr rtlCol="0" anchor="ctr"/>
+          <a:lstStyle/>
+          <a:p>
+            <a:pPr algn="ctr"/>
+            <a:endParaRPr lang="nl-NL"/>
+          </a:p>
+        </p:txBody>
+      </p:sp>
+    </p:spTree>
+    <p:extLst>
+      <p:ext uri="{BB962C8B-B14F-4D97-AF65-F5344CB8AC3E}">
+        <p14:creationId xmlns:p14="http://schemas.microsoft.com/office/powerpoint/2010/main" val="1181346886"/>
+      </p:ext>
+    </p:extLst>
+  </p:cSld>
+  <p:clrMapOvr>
+    <a:masterClrMapping/>
+  </p:clrMapOvr>
+</p:sld>
+</file>
+
+<file path=ppt/slides/slide38.xml><?xml version="1.0" encoding="utf-8"?>
+<p:sld xmlns:a="http://schemas.openxmlformats.org/drawingml/2006/main" xmlns:r="http://schemas.openxmlformats.org/officeDocument/2006/relationships" xmlns:p="http://schemas.openxmlformats.org/presentationml/2006/main" show="0">
+  <p:cSld>
+    <p:spTree>
+      <p:nvGrpSpPr>
+        <p:cNvPr id="1" name="">
+          <a:extLst>
+            <a:ext uri="{FF2B5EF4-FFF2-40B4-BE49-F238E27FC236}">
+              <a16:creationId xmlns:a16="http://schemas.microsoft.com/office/drawing/2014/main" id="{81E6E7BF-D0E7-8CC9-A652-5EFD5B67776B}"/>
+            </a:ext>
+          </a:extLst>
+        </p:cNvPr>
+        <p:cNvGrpSpPr/>
+        <p:nvPr/>
+      </p:nvGrpSpPr>
+      <p:grpSpPr>
+        <a:xfrm>
+          <a:off x="0" y="0"/>
+          <a:ext cx="0" cy="0"/>
+          <a:chOff x="0" y="0"/>
+          <a:chExt cx="0" cy="0"/>
+        </a:xfrm>
+      </p:grpSpPr>
+      <p:sp>
+        <p:nvSpPr>
+          <p:cNvPr id="2" name="Title 1">
+            <a:extLst>
+              <a:ext uri="{FF2B5EF4-FFF2-40B4-BE49-F238E27FC236}">
+                <a16:creationId xmlns:a16="http://schemas.microsoft.com/office/drawing/2014/main" id="{120501EB-C797-DCA7-052E-57256E1238D9}"/>
+              </a:ext>
+            </a:extLst>
+          </p:cNvPr>
+          <p:cNvSpPr>
+            <a:spLocks noGrp="1"/>
+          </p:cNvSpPr>
+          <p:nvPr>
+            <p:ph type="title"/>
+          </p:nvPr>
+        </p:nvSpPr>
+        <p:spPr>
+          <a:xfrm>
+            <a:off x="838200" y="365126"/>
+            <a:ext cx="10515600" cy="718608"/>
+          </a:xfrm>
+        </p:spPr>
+        <p:txBody>
+          <a:bodyPr>
+            <a:normAutofit/>
+          </a:bodyPr>
+          <a:lstStyle/>
+          <a:p>
+            <a:r>
+              <a:rPr lang="nl-NL" sz="3600" noProof="0" dirty="0"/>
+              <a:t>Issue aanmaken</a:t>
+            </a:r>
+          </a:p>
+        </p:txBody>
+      </p:sp>
+      <p:sp>
+        <p:nvSpPr>
+          <p:cNvPr id="15" name="Content Placeholder 2">
+            <a:extLst>
+              <a:ext uri="{FF2B5EF4-FFF2-40B4-BE49-F238E27FC236}">
+                <a16:creationId xmlns:a16="http://schemas.microsoft.com/office/drawing/2014/main" id="{861D6860-F466-E416-744A-C4E0E758D132}"/>
+              </a:ext>
+            </a:extLst>
+          </p:cNvPr>
+          <p:cNvSpPr txBox="1">
+            <a:spLocks/>
+          </p:cNvSpPr>
+          <p:nvPr/>
+        </p:nvSpPr>
+        <p:spPr>
+          <a:xfrm>
+            <a:off x="838200" y="1456267"/>
+            <a:ext cx="2921758" cy="4720696"/>
+          </a:xfrm>
+          <a:prstGeom prst="rect">
+            <a:avLst/>
+          </a:prstGeom>
+        </p:spPr>
+        <p:txBody>
+          <a:bodyPr vert="horz" lIns="91440" tIns="45720" rIns="91440" bIns="45720" rtlCol="0">
+            <a:noAutofit/>
+          </a:bodyPr>
+          <a:lstStyle>
+            <a:lvl1pPr marL="228600" indent="-228600" algn="l" defTabSz="914400" rtl="0" eaLnBrk="1" latinLnBrk="0" hangingPunct="1">
+              <a:lnSpc>
+                <a:spcPct val="90000"/>
+              </a:lnSpc>
+              <a:spcBef>
+                <a:spcPts val="1000"/>
+              </a:spcBef>
+              <a:buFont typeface="Arial" panose="020B0604020202020204" pitchFamily="34" charset="0"/>
+              <a:buChar char="•"/>
+              <a:defRPr sz="2800" kern="1200">
+                <a:solidFill>
+                  <a:schemeClr val="tx1"/>
+                </a:solidFill>
+                <a:latin typeface="+mn-lt"/>
+                <a:ea typeface="+mn-ea"/>
+                <a:cs typeface="+mn-cs"/>
+              </a:defRPr>
+            </a:lvl1pPr>
+            <a:lvl2pPr marL="685800" indent="-228600" algn="l" defTabSz="914400" rtl="0" eaLnBrk="1" latinLnBrk="0" hangingPunct="1">
+              <a:lnSpc>
+                <a:spcPct val="90000"/>
+              </a:lnSpc>
+              <a:spcBef>
+                <a:spcPts val="500"/>
+              </a:spcBef>
+              <a:buFont typeface="Arial" panose="020B0604020202020204" pitchFamily="34" charset="0"/>
+              <a:buChar char="•"/>
+              <a:defRPr sz="2400" kern="1200">
+                <a:solidFill>
+                  <a:schemeClr val="tx1"/>
+                </a:solidFill>
+                <a:latin typeface="+mn-lt"/>
+                <a:ea typeface="+mn-ea"/>
+                <a:cs typeface="+mn-cs"/>
+              </a:defRPr>
+            </a:lvl2pPr>
+            <a:lvl3pPr marL="1143000" indent="-228600" algn="l" defTabSz="914400" rtl="0" eaLnBrk="1" latinLnBrk="0" hangingPunct="1">
+              <a:lnSpc>
+                <a:spcPct val="90000"/>
+              </a:lnSpc>
+              <a:spcBef>
+                <a:spcPts val="500"/>
+              </a:spcBef>
+              <a:buFont typeface="Arial" panose="020B0604020202020204" pitchFamily="34" charset="0"/>
+              <a:buChar char="•"/>
+              <a:defRPr sz="2000" kern="1200">
+                <a:solidFill>
+                  <a:schemeClr val="tx1"/>
+                </a:solidFill>
+                <a:latin typeface="+mn-lt"/>
+                <a:ea typeface="+mn-ea"/>
+                <a:cs typeface="+mn-cs"/>
+              </a:defRPr>
+            </a:lvl3pPr>
+            <a:lvl4pPr marL="1600200" indent="-228600" algn="l" defTabSz="914400" rtl="0" eaLnBrk="1" latinLnBrk="0" hangingPunct="1">
+              <a:lnSpc>
+                <a:spcPct val="90000"/>
+              </a:lnSpc>
+              <a:spcBef>
+                <a:spcPts val="500"/>
+              </a:spcBef>
+              <a:buFont typeface="Arial" panose="020B0604020202020204" pitchFamily="34" charset="0"/>
+              <a:buChar char="•"/>
+              <a:defRPr sz="1800" kern="1200">
+                <a:solidFill>
+                  <a:schemeClr val="tx1"/>
+                </a:solidFill>
+                <a:latin typeface="+mn-lt"/>
+                <a:ea typeface="+mn-ea"/>
+                <a:cs typeface="+mn-cs"/>
+              </a:defRPr>
+            </a:lvl4pPr>
+            <a:lvl5pPr marL="2057400" indent="-228600" algn="l" defTabSz="914400" rtl="0" eaLnBrk="1" latinLnBrk="0" hangingPunct="1">
+              <a:lnSpc>
+                <a:spcPct val="90000"/>
+              </a:lnSpc>
+              <a:spcBef>
+                <a:spcPts val="500"/>
+              </a:spcBef>
+              <a:buFont typeface="Arial" panose="020B0604020202020204" pitchFamily="34" charset="0"/>
+              <a:buChar char="•"/>
+              <a:defRPr sz="1800" kern="1200">
+                <a:solidFill>
+                  <a:schemeClr val="tx1"/>
+                </a:solidFill>
+                <a:latin typeface="+mn-lt"/>
+                <a:ea typeface="+mn-ea"/>
+                <a:cs typeface="+mn-cs"/>
+              </a:defRPr>
+            </a:lvl5pPr>
+            <a:lvl6pPr marL="2514600" indent="-228600" algn="l" defTabSz="914400" rtl="0" eaLnBrk="1" latinLnBrk="0" hangingPunct="1">
+              <a:lnSpc>
+                <a:spcPct val="90000"/>
+              </a:lnSpc>
+              <a:spcBef>
+                <a:spcPts val="500"/>
+              </a:spcBef>
+              <a:buFont typeface="Arial" panose="020B0604020202020204" pitchFamily="34" charset="0"/>
+              <a:buChar char="•"/>
+              <a:defRPr sz="1800" kern="1200">
+                <a:solidFill>
+                  <a:schemeClr val="tx1"/>
+                </a:solidFill>
+                <a:latin typeface="+mn-lt"/>
+                <a:ea typeface="+mn-ea"/>
+                <a:cs typeface="+mn-cs"/>
+              </a:defRPr>
+            </a:lvl6pPr>
+            <a:lvl7pPr marL="2971800" indent="-228600" algn="l" defTabSz="914400" rtl="0" eaLnBrk="1" latinLnBrk="0" hangingPunct="1">
+              <a:lnSpc>
+                <a:spcPct val="90000"/>
+              </a:lnSpc>
+              <a:spcBef>
+                <a:spcPts val="500"/>
+              </a:spcBef>
+              <a:buFont typeface="Arial" panose="020B0604020202020204" pitchFamily="34" charset="0"/>
+              <a:buChar char="•"/>
+              <a:defRPr sz="1800" kern="1200">
+                <a:solidFill>
+                  <a:schemeClr val="tx1"/>
+                </a:solidFill>
+                <a:latin typeface="+mn-lt"/>
+                <a:ea typeface="+mn-ea"/>
+                <a:cs typeface="+mn-cs"/>
+              </a:defRPr>
+            </a:lvl7pPr>
+            <a:lvl8pPr marL="3429000" indent="-228600" algn="l" defTabSz="914400" rtl="0" eaLnBrk="1" latinLnBrk="0" hangingPunct="1">
+              <a:lnSpc>
+                <a:spcPct val="90000"/>
+              </a:lnSpc>
+              <a:spcBef>
+                <a:spcPts val="500"/>
+              </a:spcBef>
+              <a:buFont typeface="Arial" panose="020B0604020202020204" pitchFamily="34" charset="0"/>
+              <a:buChar char="•"/>
+              <a:defRPr sz="1800" kern="1200">
+                <a:solidFill>
+                  <a:schemeClr val="tx1"/>
+                </a:solidFill>
+                <a:latin typeface="+mn-lt"/>
+                <a:ea typeface="+mn-ea"/>
+                <a:cs typeface="+mn-cs"/>
+              </a:defRPr>
+            </a:lvl8pPr>
+            <a:lvl9pPr marL="3886200" indent="-228600" algn="l" defTabSz="914400" rtl="0" eaLnBrk="1" latinLnBrk="0" hangingPunct="1">
+              <a:lnSpc>
+                <a:spcPct val="90000"/>
+              </a:lnSpc>
+              <a:spcBef>
+                <a:spcPts val="500"/>
+              </a:spcBef>
+              <a:buFont typeface="Arial" panose="020B0604020202020204" pitchFamily="34" charset="0"/>
+              <a:buChar char="•"/>
+              <a:defRPr sz="1800" kern="1200">
+                <a:solidFill>
+                  <a:schemeClr val="tx1"/>
+                </a:solidFill>
+                <a:latin typeface="+mn-lt"/>
+                <a:ea typeface="+mn-ea"/>
+                <a:cs typeface="+mn-cs"/>
+              </a:defRPr>
+            </a:lvl9pPr>
+          </a:lstStyle>
+          <a:p>
+            <a:pPr marL="0" indent="0">
+              <a:lnSpc>
+                <a:spcPct val="100000"/>
+              </a:lnSpc>
+              <a:spcBef>
+                <a:spcPts val="600"/>
+              </a:spcBef>
+              <a:buFont typeface="Arial" panose="020B0604020202020204" pitchFamily="34" charset="0"/>
+              <a:buNone/>
+            </a:pPr>
+            <a:r>
+              <a:rPr lang="nl-NL" sz="1400" dirty="0"/>
+              <a:t>Issues gekoppeld aan een repository en optioneel aan een project.</a:t>
+            </a:r>
+          </a:p>
+          <a:p>
+            <a:pPr marL="0" indent="0">
+              <a:lnSpc>
+                <a:spcPct val="100000"/>
+              </a:lnSpc>
+              <a:spcBef>
+                <a:spcPts val="600"/>
+              </a:spcBef>
+              <a:buFont typeface="Arial" panose="020B0604020202020204" pitchFamily="34" charset="0"/>
+              <a:buNone/>
+            </a:pPr>
+            <a:endParaRPr lang="nl-NL" sz="1400" b="1" dirty="0"/>
+          </a:p>
+          <a:p>
+            <a:pPr marL="0" indent="0">
+              <a:lnSpc>
+                <a:spcPct val="100000"/>
+              </a:lnSpc>
+              <a:spcBef>
+                <a:spcPts val="600"/>
+              </a:spcBef>
+              <a:buFont typeface="Arial" panose="020B0604020202020204" pitchFamily="34" charset="0"/>
+              <a:buNone/>
+            </a:pPr>
+            <a:r>
+              <a:rPr lang="nl-NL" sz="1400" b="1" dirty="0"/>
+              <a:t>Via een project</a:t>
+            </a:r>
+          </a:p>
+          <a:p>
+            <a:pPr>
+              <a:lnSpc>
+                <a:spcPct val="100000"/>
+              </a:lnSpc>
+              <a:spcBef>
+                <a:spcPts val="600"/>
+              </a:spcBef>
+              <a:buFontTx/>
+              <a:buChar char="-"/>
+            </a:pPr>
+            <a:r>
+              <a:rPr lang="nl-NL" sz="1400" dirty="0"/>
+              <a:t>Ga naar het project.</a:t>
+            </a:r>
+          </a:p>
+          <a:p>
+            <a:pPr>
+              <a:lnSpc>
+                <a:spcPct val="100000"/>
+              </a:lnSpc>
+              <a:spcBef>
+                <a:spcPts val="600"/>
+              </a:spcBef>
+              <a:buFontTx/>
+              <a:buChar char="-"/>
+            </a:pPr>
+            <a:r>
+              <a:rPr lang="nl-NL" sz="1400" dirty="0"/>
+              <a:t>Klik op </a:t>
+            </a:r>
+            <a:r>
+              <a:rPr lang="nl-NL" sz="1400" dirty="0" err="1"/>
+              <a:t>Backlog</a:t>
+            </a:r>
+            <a:r>
+              <a:rPr lang="nl-NL" sz="1400" dirty="0"/>
+              <a:t>.</a:t>
+            </a:r>
+          </a:p>
+          <a:p>
+            <a:pPr>
+              <a:lnSpc>
+                <a:spcPct val="100000"/>
+              </a:lnSpc>
+              <a:spcBef>
+                <a:spcPts val="600"/>
+              </a:spcBef>
+              <a:buFontTx/>
+              <a:buChar char="-"/>
+            </a:pPr>
+            <a:r>
+              <a:rPr lang="nl-NL" sz="1400" dirty="0"/>
+              <a:t>Klik onderaan op + </a:t>
+            </a:r>
+            <a:r>
+              <a:rPr lang="nl-NL" sz="1400" dirty="0" err="1"/>
+              <a:t>Add</a:t>
+            </a:r>
+            <a:r>
+              <a:rPr lang="nl-NL" sz="1400" dirty="0"/>
+              <a:t> item.</a:t>
+            </a:r>
+          </a:p>
+          <a:p>
+            <a:pPr>
+              <a:lnSpc>
+                <a:spcPct val="100000"/>
+              </a:lnSpc>
+              <a:spcBef>
+                <a:spcPts val="600"/>
+              </a:spcBef>
+              <a:buFontTx/>
+              <a:buChar char="-"/>
+            </a:pPr>
+            <a:r>
+              <a:rPr lang="nl-NL" sz="1400" dirty="0"/>
+              <a:t>Kies </a:t>
+            </a:r>
+            <a:r>
+              <a:rPr lang="nl-NL" sz="1400" dirty="0" err="1"/>
+              <a:t>Create</a:t>
+            </a:r>
+            <a:r>
+              <a:rPr lang="nl-NL" sz="1400" dirty="0"/>
+              <a:t> new item.</a:t>
+            </a:r>
+          </a:p>
+          <a:p>
+            <a:pPr>
+              <a:lnSpc>
+                <a:spcPct val="100000"/>
+              </a:lnSpc>
+              <a:spcBef>
+                <a:spcPts val="600"/>
+              </a:spcBef>
+              <a:buFontTx/>
+              <a:buChar char="-"/>
+            </a:pPr>
+            <a:r>
+              <a:rPr lang="nl-NL" sz="1400" dirty="0"/>
+              <a:t>Kies het repository.</a:t>
+            </a:r>
+          </a:p>
+          <a:p>
+            <a:pPr>
+              <a:lnSpc>
+                <a:spcPct val="100000"/>
+              </a:lnSpc>
+              <a:spcBef>
+                <a:spcPts val="600"/>
+              </a:spcBef>
+              <a:buFontTx/>
+              <a:buChar char="-"/>
+            </a:pPr>
+            <a:r>
+              <a:rPr lang="nl-NL" sz="1400" dirty="0"/>
+              <a:t>Vul de gegevens in.</a:t>
+            </a:r>
+          </a:p>
+          <a:p>
+            <a:pPr marL="0" indent="0">
+              <a:lnSpc>
+                <a:spcPct val="100000"/>
+              </a:lnSpc>
+              <a:spcBef>
+                <a:spcPts val="600"/>
+              </a:spcBef>
+              <a:buFont typeface="Arial" panose="020B0604020202020204" pitchFamily="34" charset="0"/>
+              <a:buNone/>
+            </a:pPr>
+            <a:endParaRPr lang="nl-NL" sz="1400" dirty="0"/>
+          </a:p>
+          <a:p>
+            <a:pPr marL="0" indent="0">
+              <a:lnSpc>
+                <a:spcPct val="100000"/>
+              </a:lnSpc>
+              <a:spcBef>
+                <a:spcPts val="600"/>
+              </a:spcBef>
+              <a:buNone/>
+            </a:pPr>
+            <a:endParaRPr lang="nl-NL" sz="1400" dirty="0"/>
+          </a:p>
+          <a:p>
+            <a:pPr marL="0" indent="0">
+              <a:lnSpc>
+                <a:spcPct val="100000"/>
+              </a:lnSpc>
+              <a:spcBef>
+                <a:spcPts val="600"/>
+              </a:spcBef>
+              <a:buNone/>
+            </a:pPr>
+            <a:endParaRPr lang="nl-NL" sz="1400" dirty="0"/>
+          </a:p>
+          <a:p>
+            <a:pPr marL="0" indent="0">
+              <a:lnSpc>
+                <a:spcPct val="100000"/>
+              </a:lnSpc>
+              <a:spcBef>
+                <a:spcPts val="600"/>
+              </a:spcBef>
+              <a:buFont typeface="Arial" panose="020B0604020202020204" pitchFamily="34" charset="0"/>
+              <a:buNone/>
+            </a:pPr>
+            <a:endParaRPr lang="nl-NL" sz="1400" dirty="0"/>
+          </a:p>
+        </p:txBody>
+      </p:sp>
+      <p:pic>
+        <p:nvPicPr>
+          <p:cNvPr id="5" name="Picture 4" descr="A screenshot of a computer&#10;&#10;Description automatically generated">
+            <a:extLst>
+              <a:ext uri="{FF2B5EF4-FFF2-40B4-BE49-F238E27FC236}">
+                <a16:creationId xmlns:a16="http://schemas.microsoft.com/office/drawing/2014/main" id="{9ECEBFEB-DC73-4239-9299-BA8512B3DAB1}"/>
+              </a:ext>
+            </a:extLst>
+          </p:cNvPr>
+          <p:cNvPicPr>
+            <a:picLocks noChangeAspect="1"/>
+          </p:cNvPicPr>
+          <p:nvPr/>
+        </p:nvPicPr>
+        <p:blipFill>
+          <a:blip r:embed="rId2">
+            <a:extLst>
+              <a:ext uri="{28A0092B-C50C-407E-A947-70E740481C1C}">
+                <a14:useLocalDpi xmlns:a14="http://schemas.microsoft.com/office/drawing/2010/main" val="0"/>
+              </a:ext>
+            </a:extLst>
+          </a:blip>
+          <a:stretch>
+            <a:fillRect/>
+          </a:stretch>
+        </p:blipFill>
+        <p:spPr>
+          <a:xfrm>
+            <a:off x="6294194" y="1456267"/>
+            <a:ext cx="5059606" cy="4707072"/>
+          </a:xfrm>
+          <a:prstGeom prst="rect">
+            <a:avLst/>
+          </a:prstGeom>
+          <a:ln>
+            <a:solidFill>
+              <a:schemeClr val="tx1"/>
+            </a:solidFill>
+          </a:ln>
+        </p:spPr>
+      </p:pic>
+      <p:cxnSp>
+        <p:nvCxnSpPr>
+          <p:cNvPr id="7" name="Straight Connector 6">
+            <a:extLst>
+              <a:ext uri="{FF2B5EF4-FFF2-40B4-BE49-F238E27FC236}">
+                <a16:creationId xmlns:a16="http://schemas.microsoft.com/office/drawing/2014/main" id="{4B764C4F-269F-6E95-F6DA-6AFA7D47A2B4}"/>
+              </a:ext>
+            </a:extLst>
+          </p:cNvPr>
+          <p:cNvCxnSpPr/>
+          <p:nvPr/>
+        </p:nvCxnSpPr>
+        <p:spPr>
+          <a:xfrm>
+            <a:off x="6453051" y="2142309"/>
+            <a:ext cx="1822269" cy="0"/>
+          </a:xfrm>
+          <a:prstGeom prst="line">
+            <a:avLst/>
+          </a:prstGeom>
+          <a:ln>
+            <a:solidFill>
+              <a:schemeClr val="accent2"/>
+            </a:solidFill>
+          </a:ln>
+        </p:spPr>
+        <p:style>
+          <a:lnRef idx="2">
+            <a:schemeClr val="accent2"/>
+          </a:lnRef>
+          <a:fillRef idx="0">
+            <a:schemeClr val="accent2"/>
+          </a:fillRef>
+          <a:effectRef idx="1">
+            <a:schemeClr val="accent2"/>
+          </a:effectRef>
+          <a:fontRef idx="minor">
+            <a:schemeClr val="tx1"/>
+          </a:fontRef>
+        </p:style>
+      </p:cxnSp>
+    </p:spTree>
+    <p:extLst>
+      <p:ext uri="{BB962C8B-B14F-4D97-AF65-F5344CB8AC3E}">
+        <p14:creationId xmlns:p14="http://schemas.microsoft.com/office/powerpoint/2010/main" val="2473046667"/>
+      </p:ext>
+    </p:extLst>
+  </p:cSld>
+  <p:clrMapOvr>
+    <a:masterClrMapping/>
+  </p:clrMapOvr>
+</p:sld>
+</file>
+
+<file path=ppt/slides/slide39.xml><?xml version="1.0" encoding="utf-8"?>
+<p:sld xmlns:a="http://schemas.openxmlformats.org/drawingml/2006/main" xmlns:r="http://schemas.openxmlformats.org/officeDocument/2006/relationships" xmlns:p="http://schemas.openxmlformats.org/presentationml/2006/main">
+  <p:cSld>
+    <p:spTree>
+      <p:nvGrpSpPr>
+        <p:cNvPr id="1" name="">
+          <a:extLst>
+            <a:ext uri="{FF2B5EF4-FFF2-40B4-BE49-F238E27FC236}">
               <a16:creationId xmlns:a16="http://schemas.microsoft.com/office/drawing/2014/main" id="{3E923243-7060-08BD-5B17-B06F47013926}"/>
             </a:ext>
           </a:extLst>
@@ -22233,7 +23578,7 @@
         <p:spPr>
           <a:xfrm>
             <a:off x="838200" y="1456267"/>
-            <a:ext cx="2921758" cy="4720696"/>
+            <a:ext cx="3512344" cy="4720696"/>
           </a:xfrm>
           <a:prstGeom prst="rect">
             <a:avLst/>
@@ -22419,12 +23764,53 @@
               <a:buNone/>
             </a:pPr>
             <a:r>
-              <a:rPr lang="nl-NL" sz="1400" b="1" dirty="0" err="1"/>
-              <a:t>Verchillende</a:t>
-            </a:r>
-            <a:r>
               <a:rPr lang="nl-NL" sz="1400" b="1" dirty="0"/>
-              <a:t> project types:</a:t>
+              <a:t>Wat is een project?</a:t>
+            </a:r>
+          </a:p>
+          <a:p>
+            <a:pPr marL="0" indent="0">
+              <a:lnSpc>
+                <a:spcPct val="100000"/>
+              </a:lnSpc>
+              <a:spcBef>
+                <a:spcPts val="600"/>
+              </a:spcBef>
+              <a:buFont typeface="Arial" panose="020B0604020202020204" pitchFamily="34" charset="0"/>
+              <a:buNone/>
+            </a:pPr>
+            <a:r>
+              <a:rPr lang="nl-NL" sz="1400" dirty="0"/>
+              <a:t>Een manier om issues overzichtelijk te beheren.</a:t>
+            </a:r>
+          </a:p>
+          <a:p>
+            <a:pPr marL="0" indent="0">
+              <a:lnSpc>
+                <a:spcPct val="100000"/>
+              </a:lnSpc>
+              <a:spcBef>
+                <a:spcPts val="600"/>
+              </a:spcBef>
+              <a:buFont typeface="Arial" panose="020B0604020202020204" pitchFamily="34" charset="0"/>
+              <a:buNone/>
+            </a:pPr>
+            <a:endParaRPr lang="nl-NL" sz="1400" b="1" dirty="0"/>
+          </a:p>
+          <a:p>
+            <a:pPr marL="0" indent="0">
+              <a:lnSpc>
+                <a:spcPct val="100000"/>
+              </a:lnSpc>
+              <a:spcBef>
+                <a:spcPts val="600"/>
+              </a:spcBef>
+              <a:buFont typeface="Arial" panose="020B0604020202020204" pitchFamily="34" charset="0"/>
+              <a:buNone/>
+            </a:pPr>
+            <a:r>
+              <a:rPr lang="nl-NL" sz="1400" b="1" dirty="0"/>
+              <a:t>Verschillende project types:</a:t>
             </a:r>
           </a:p>
           <a:p>
@@ -22457,7 +23843,7 @@
             </a:pPr>
             <a:r>
               <a:rPr lang="nl-NL" sz="1400" dirty="0"/>
-              <a:t>Sprints</a:t>
+              <a:t>Team planning (sprints)</a:t>
             </a:r>
           </a:p>
           <a:p>
@@ -22557,1039 +23943,6 @@
     <p:extLst>
       <p:ext uri="{BB962C8B-B14F-4D97-AF65-F5344CB8AC3E}">
         <p14:creationId xmlns:p14="http://schemas.microsoft.com/office/powerpoint/2010/main" val="959609857"/>
-      </p:ext>
-    </p:extLst>
-  </p:cSld>
-  <p:clrMapOvr>
-    <a:masterClrMapping/>
-  </p:clrMapOvr>
-</p:sld>
-</file>
-
-<file path=ppt/slides/slide38.xml><?xml version="1.0" encoding="utf-8"?>
-<p:sld xmlns:a="http://schemas.openxmlformats.org/drawingml/2006/main" xmlns:r="http://schemas.openxmlformats.org/officeDocument/2006/relationships" xmlns:p="http://schemas.openxmlformats.org/presentationml/2006/main">
-  <p:cSld>
-    <p:spTree>
-      <p:nvGrpSpPr>
-        <p:cNvPr id="1" name="">
-          <a:extLst>
-            <a:ext uri="{FF2B5EF4-FFF2-40B4-BE49-F238E27FC236}">
-              <a16:creationId xmlns:a16="http://schemas.microsoft.com/office/drawing/2014/main" id="{702EC3AE-0169-3972-ED43-AD95D673F3AA}"/>
-            </a:ext>
-          </a:extLst>
-        </p:cNvPr>
-        <p:cNvGrpSpPr/>
-        <p:nvPr/>
-      </p:nvGrpSpPr>
-      <p:grpSpPr>
-        <a:xfrm>
-          <a:off x="0" y="0"/>
-          <a:ext cx="0" cy="0"/>
-          <a:chOff x="0" y="0"/>
-          <a:chExt cx="0" cy="0"/>
-        </a:xfrm>
-      </p:grpSpPr>
-      <p:sp>
-        <p:nvSpPr>
-          <p:cNvPr id="2" name="Title 1">
-            <a:extLst>
-              <a:ext uri="{FF2B5EF4-FFF2-40B4-BE49-F238E27FC236}">
-                <a16:creationId xmlns:a16="http://schemas.microsoft.com/office/drawing/2014/main" id="{85BC5656-2A36-B53F-DB52-9C99DA4E6371}"/>
-              </a:ext>
-            </a:extLst>
-          </p:cNvPr>
-          <p:cNvSpPr>
-            <a:spLocks noGrp="1"/>
-          </p:cNvSpPr>
-          <p:nvPr>
-            <p:ph type="title"/>
-          </p:nvPr>
-        </p:nvSpPr>
-        <p:spPr>
-          <a:xfrm>
-            <a:off x="838200" y="365126"/>
-            <a:ext cx="10515600" cy="718608"/>
-          </a:xfrm>
-        </p:spPr>
-        <p:txBody>
-          <a:bodyPr>
-            <a:normAutofit/>
-          </a:bodyPr>
-          <a:lstStyle/>
-          <a:p>
-            <a:r>
-              <a:rPr lang="nl-NL" sz="3600" dirty="0"/>
-              <a:t>Project aanmaken</a:t>
-            </a:r>
-            <a:endParaRPr lang="nl-NL" sz="3600" noProof="0" dirty="0"/>
-          </a:p>
-        </p:txBody>
-      </p:sp>
-      <p:sp>
-        <p:nvSpPr>
-          <p:cNvPr id="15" name="Content Placeholder 2">
-            <a:extLst>
-              <a:ext uri="{FF2B5EF4-FFF2-40B4-BE49-F238E27FC236}">
-                <a16:creationId xmlns:a16="http://schemas.microsoft.com/office/drawing/2014/main" id="{8A98D2FF-672C-B65D-CD5F-9C29055B0C88}"/>
-              </a:ext>
-            </a:extLst>
-          </p:cNvPr>
-          <p:cNvSpPr txBox="1">
-            <a:spLocks/>
-          </p:cNvSpPr>
-          <p:nvPr/>
-        </p:nvSpPr>
-        <p:spPr>
-          <a:xfrm>
-            <a:off x="838200" y="1456267"/>
-            <a:ext cx="2921758" cy="4720696"/>
-          </a:xfrm>
-          <a:prstGeom prst="rect">
-            <a:avLst/>
-          </a:prstGeom>
-        </p:spPr>
-        <p:txBody>
-          <a:bodyPr vert="horz" lIns="91440" tIns="45720" rIns="91440" bIns="45720" rtlCol="0">
-            <a:normAutofit/>
-          </a:bodyPr>
-          <a:lstStyle>
-            <a:lvl1pPr marL="228600" indent="-228600" algn="l" defTabSz="914400" rtl="0" eaLnBrk="1" latinLnBrk="0" hangingPunct="1">
-              <a:lnSpc>
-                <a:spcPct val="90000"/>
-              </a:lnSpc>
-              <a:spcBef>
-                <a:spcPts val="1000"/>
-              </a:spcBef>
-              <a:buFont typeface="Arial" panose="020B0604020202020204" pitchFamily="34" charset="0"/>
-              <a:buChar char="•"/>
-              <a:defRPr sz="2800" kern="1200">
-                <a:solidFill>
-                  <a:schemeClr val="tx1"/>
-                </a:solidFill>
-                <a:latin typeface="+mn-lt"/>
-                <a:ea typeface="+mn-ea"/>
-                <a:cs typeface="+mn-cs"/>
-              </a:defRPr>
-            </a:lvl1pPr>
-            <a:lvl2pPr marL="685800" indent="-228600" algn="l" defTabSz="914400" rtl="0" eaLnBrk="1" latinLnBrk="0" hangingPunct="1">
-              <a:lnSpc>
-                <a:spcPct val="90000"/>
-              </a:lnSpc>
-              <a:spcBef>
-                <a:spcPts val="500"/>
-              </a:spcBef>
-              <a:buFont typeface="Arial" panose="020B0604020202020204" pitchFamily="34" charset="0"/>
-              <a:buChar char="•"/>
-              <a:defRPr sz="2400" kern="1200">
-                <a:solidFill>
-                  <a:schemeClr val="tx1"/>
-                </a:solidFill>
-                <a:latin typeface="+mn-lt"/>
-                <a:ea typeface="+mn-ea"/>
-                <a:cs typeface="+mn-cs"/>
-              </a:defRPr>
-            </a:lvl2pPr>
-            <a:lvl3pPr marL="1143000" indent="-228600" algn="l" defTabSz="914400" rtl="0" eaLnBrk="1" latinLnBrk="0" hangingPunct="1">
-              <a:lnSpc>
-                <a:spcPct val="90000"/>
-              </a:lnSpc>
-              <a:spcBef>
-                <a:spcPts val="500"/>
-              </a:spcBef>
-              <a:buFont typeface="Arial" panose="020B0604020202020204" pitchFamily="34" charset="0"/>
-              <a:buChar char="•"/>
-              <a:defRPr sz="2000" kern="1200">
-                <a:solidFill>
-                  <a:schemeClr val="tx1"/>
-                </a:solidFill>
-                <a:latin typeface="+mn-lt"/>
-                <a:ea typeface="+mn-ea"/>
-                <a:cs typeface="+mn-cs"/>
-              </a:defRPr>
-            </a:lvl3pPr>
-            <a:lvl4pPr marL="1600200" indent="-228600" algn="l" defTabSz="914400" rtl="0" eaLnBrk="1" latinLnBrk="0" hangingPunct="1">
-              <a:lnSpc>
-                <a:spcPct val="90000"/>
-              </a:lnSpc>
-              <a:spcBef>
-                <a:spcPts val="500"/>
-              </a:spcBef>
-              <a:buFont typeface="Arial" panose="020B0604020202020204" pitchFamily="34" charset="0"/>
-              <a:buChar char="•"/>
-              <a:defRPr sz="1800" kern="1200">
-                <a:solidFill>
-                  <a:schemeClr val="tx1"/>
-                </a:solidFill>
-                <a:latin typeface="+mn-lt"/>
-                <a:ea typeface="+mn-ea"/>
-                <a:cs typeface="+mn-cs"/>
-              </a:defRPr>
-            </a:lvl4pPr>
-            <a:lvl5pPr marL="2057400" indent="-228600" algn="l" defTabSz="914400" rtl="0" eaLnBrk="1" latinLnBrk="0" hangingPunct="1">
-              <a:lnSpc>
-                <a:spcPct val="90000"/>
-              </a:lnSpc>
-              <a:spcBef>
-                <a:spcPts val="500"/>
-              </a:spcBef>
-              <a:buFont typeface="Arial" panose="020B0604020202020204" pitchFamily="34" charset="0"/>
-              <a:buChar char="•"/>
-              <a:defRPr sz="1800" kern="1200">
-                <a:solidFill>
-                  <a:schemeClr val="tx1"/>
-                </a:solidFill>
-                <a:latin typeface="+mn-lt"/>
-                <a:ea typeface="+mn-ea"/>
-                <a:cs typeface="+mn-cs"/>
-              </a:defRPr>
-            </a:lvl5pPr>
-            <a:lvl6pPr marL="2514600" indent="-228600" algn="l" defTabSz="914400" rtl="0" eaLnBrk="1" latinLnBrk="0" hangingPunct="1">
-              <a:lnSpc>
-                <a:spcPct val="90000"/>
-              </a:lnSpc>
-              <a:spcBef>
-                <a:spcPts val="500"/>
-              </a:spcBef>
-              <a:buFont typeface="Arial" panose="020B0604020202020204" pitchFamily="34" charset="0"/>
-              <a:buChar char="•"/>
-              <a:defRPr sz="1800" kern="1200">
-                <a:solidFill>
-                  <a:schemeClr val="tx1"/>
-                </a:solidFill>
-                <a:latin typeface="+mn-lt"/>
-                <a:ea typeface="+mn-ea"/>
-                <a:cs typeface="+mn-cs"/>
-              </a:defRPr>
-            </a:lvl6pPr>
-            <a:lvl7pPr marL="2971800" indent="-228600" algn="l" defTabSz="914400" rtl="0" eaLnBrk="1" latinLnBrk="0" hangingPunct="1">
-              <a:lnSpc>
-                <a:spcPct val="90000"/>
-              </a:lnSpc>
-              <a:spcBef>
-                <a:spcPts val="500"/>
-              </a:spcBef>
-              <a:buFont typeface="Arial" panose="020B0604020202020204" pitchFamily="34" charset="0"/>
-              <a:buChar char="•"/>
-              <a:defRPr sz="1800" kern="1200">
-                <a:solidFill>
-                  <a:schemeClr val="tx1"/>
-                </a:solidFill>
-                <a:latin typeface="+mn-lt"/>
-                <a:ea typeface="+mn-ea"/>
-                <a:cs typeface="+mn-cs"/>
-              </a:defRPr>
-            </a:lvl7pPr>
-            <a:lvl8pPr marL="3429000" indent="-228600" algn="l" defTabSz="914400" rtl="0" eaLnBrk="1" latinLnBrk="0" hangingPunct="1">
-              <a:lnSpc>
-                <a:spcPct val="90000"/>
-              </a:lnSpc>
-              <a:spcBef>
-                <a:spcPts val="500"/>
-              </a:spcBef>
-              <a:buFont typeface="Arial" panose="020B0604020202020204" pitchFamily="34" charset="0"/>
-              <a:buChar char="•"/>
-              <a:defRPr sz="1800" kern="1200">
-                <a:solidFill>
-                  <a:schemeClr val="tx1"/>
-                </a:solidFill>
-                <a:latin typeface="+mn-lt"/>
-                <a:ea typeface="+mn-ea"/>
-                <a:cs typeface="+mn-cs"/>
-              </a:defRPr>
-            </a:lvl8pPr>
-            <a:lvl9pPr marL="3886200" indent="-228600" algn="l" defTabSz="914400" rtl="0" eaLnBrk="1" latinLnBrk="0" hangingPunct="1">
-              <a:lnSpc>
-                <a:spcPct val="90000"/>
-              </a:lnSpc>
-              <a:spcBef>
-                <a:spcPts val="500"/>
-              </a:spcBef>
-              <a:buFont typeface="Arial" panose="020B0604020202020204" pitchFamily="34" charset="0"/>
-              <a:buChar char="•"/>
-              <a:defRPr sz="1800" kern="1200">
-                <a:solidFill>
-                  <a:schemeClr val="tx1"/>
-                </a:solidFill>
-                <a:latin typeface="+mn-lt"/>
-                <a:ea typeface="+mn-ea"/>
-                <a:cs typeface="+mn-cs"/>
-              </a:defRPr>
-            </a:lvl9pPr>
-          </a:lstStyle>
-          <a:p>
-            <a:pPr marL="0" indent="0">
-              <a:lnSpc>
-                <a:spcPct val="100000"/>
-              </a:lnSpc>
-              <a:spcBef>
-                <a:spcPts val="600"/>
-              </a:spcBef>
-              <a:buFont typeface="Arial" panose="020B0604020202020204" pitchFamily="34" charset="0"/>
-              <a:buNone/>
-            </a:pPr>
-            <a:r>
-              <a:rPr lang="nl-NL" sz="1400" b="1" dirty="0" err="1"/>
-              <a:t>Verchillende</a:t>
-            </a:r>
-            <a:r>
-              <a:rPr lang="nl-NL" sz="1400" b="1" dirty="0"/>
-              <a:t> project types:</a:t>
-            </a:r>
-          </a:p>
-          <a:p>
-            <a:pPr>
-              <a:lnSpc>
-                <a:spcPct val="100000"/>
-              </a:lnSpc>
-              <a:spcBef>
-                <a:spcPts val="600"/>
-              </a:spcBef>
-              <a:buFontTx/>
-              <a:buChar char="-"/>
-            </a:pPr>
-            <a:r>
-              <a:rPr lang="nl-NL" sz="1400" dirty="0" err="1"/>
-              <a:t>Kanban</a:t>
-            </a:r>
-            <a:endParaRPr lang="nl-NL" sz="1400" dirty="0"/>
-          </a:p>
-          <a:p>
-            <a:pPr>
-              <a:lnSpc>
-                <a:spcPct val="100000"/>
-              </a:lnSpc>
-              <a:spcBef>
-                <a:spcPts val="600"/>
-              </a:spcBef>
-              <a:buFontTx/>
-              <a:buChar char="-"/>
-            </a:pPr>
-            <a:r>
-              <a:rPr lang="nl-NL" sz="1400" dirty="0"/>
-              <a:t>Sprints</a:t>
-            </a:r>
-          </a:p>
-          <a:p>
-            <a:pPr>
-              <a:lnSpc>
-                <a:spcPct val="100000"/>
-              </a:lnSpc>
-              <a:spcBef>
-                <a:spcPts val="600"/>
-              </a:spcBef>
-              <a:buFontTx/>
-              <a:buChar char="-"/>
-            </a:pPr>
-            <a:r>
-              <a:rPr lang="nl-NL" sz="1400" dirty="0"/>
-              <a:t>Bug </a:t>
-            </a:r>
-            <a:r>
-              <a:rPr lang="nl-NL" sz="1400" dirty="0" err="1"/>
-              <a:t>tracker</a:t>
-            </a:r>
-            <a:endParaRPr lang="nl-NL" sz="1400" dirty="0"/>
-          </a:p>
-          <a:p>
-            <a:pPr>
-              <a:lnSpc>
-                <a:spcPct val="100000"/>
-              </a:lnSpc>
-              <a:spcBef>
-                <a:spcPts val="600"/>
-              </a:spcBef>
-              <a:buFontTx/>
-              <a:buChar char="-"/>
-            </a:pPr>
-            <a:r>
-              <a:rPr lang="nl-NL" sz="1400" dirty="0" err="1"/>
-              <a:t>Roadmap</a:t>
-            </a:r>
-            <a:endParaRPr lang="nl-NL" sz="1400" dirty="0"/>
-          </a:p>
-          <a:p>
-            <a:pPr marL="0" indent="0">
-              <a:lnSpc>
-                <a:spcPct val="100000"/>
-              </a:lnSpc>
-              <a:spcBef>
-                <a:spcPts val="600"/>
-              </a:spcBef>
-              <a:buNone/>
-            </a:pPr>
-            <a:endParaRPr lang="nl-NL" sz="1400" dirty="0"/>
-          </a:p>
-          <a:p>
-            <a:pPr marL="0" indent="0">
-              <a:lnSpc>
-                <a:spcPct val="100000"/>
-              </a:lnSpc>
-              <a:spcBef>
-                <a:spcPts val="600"/>
-              </a:spcBef>
-              <a:buNone/>
-            </a:pPr>
-            <a:r>
-              <a:rPr lang="nl-NL" sz="1400" b="1" dirty="0"/>
-              <a:t>Project instellingen:</a:t>
-            </a:r>
-          </a:p>
-          <a:p>
-            <a:pPr>
-              <a:lnSpc>
-                <a:spcPct val="100000"/>
-              </a:lnSpc>
-              <a:spcBef>
-                <a:spcPts val="600"/>
-              </a:spcBef>
-              <a:buFontTx/>
-              <a:buChar char="-"/>
-            </a:pPr>
-            <a:r>
-              <a:rPr lang="nl-NL" sz="1400" dirty="0"/>
-              <a:t>Status voortgang</a:t>
-            </a:r>
-          </a:p>
-          <a:p>
-            <a:pPr>
-              <a:lnSpc>
-                <a:spcPct val="100000"/>
-              </a:lnSpc>
-              <a:spcBef>
-                <a:spcPts val="600"/>
-              </a:spcBef>
-              <a:buFontTx/>
-              <a:buChar char="-"/>
-            </a:pPr>
-            <a:r>
-              <a:rPr lang="nl-NL" sz="1400" dirty="0"/>
-              <a:t>Prioriteiten</a:t>
-            </a:r>
-          </a:p>
-          <a:p>
-            <a:pPr>
-              <a:lnSpc>
-                <a:spcPct val="100000"/>
-              </a:lnSpc>
-              <a:spcBef>
-                <a:spcPts val="600"/>
-              </a:spcBef>
-              <a:buFontTx/>
-              <a:buChar char="-"/>
-            </a:pPr>
-            <a:r>
-              <a:rPr lang="nl-NL" sz="1400" dirty="0"/>
-              <a:t>Aantal punten</a:t>
-            </a:r>
-          </a:p>
-          <a:p>
-            <a:pPr>
-              <a:lnSpc>
-                <a:spcPct val="100000"/>
-              </a:lnSpc>
-              <a:spcBef>
-                <a:spcPts val="600"/>
-              </a:spcBef>
-              <a:buFontTx/>
-              <a:buChar char="-"/>
-            </a:pPr>
-            <a:r>
-              <a:rPr lang="nl-NL" sz="1400" dirty="0"/>
-              <a:t>Sprints</a:t>
-            </a:r>
-          </a:p>
-          <a:p>
-            <a:pPr>
-              <a:lnSpc>
-                <a:spcPct val="100000"/>
-              </a:lnSpc>
-              <a:spcBef>
-                <a:spcPts val="600"/>
-              </a:spcBef>
-              <a:buFontTx/>
-              <a:buChar char="-"/>
-            </a:pPr>
-            <a:r>
-              <a:rPr lang="nl-NL" sz="1400" dirty="0"/>
-              <a:t>Et cetera</a:t>
-            </a:r>
-          </a:p>
-          <a:p>
-            <a:pPr>
-              <a:lnSpc>
-                <a:spcPct val="100000"/>
-              </a:lnSpc>
-              <a:spcBef>
-                <a:spcPts val="600"/>
-              </a:spcBef>
-              <a:buFontTx/>
-              <a:buChar char="-"/>
-            </a:pPr>
-            <a:endParaRPr lang="nl-NL" sz="1400" dirty="0"/>
-          </a:p>
-          <a:p>
-            <a:pPr marL="0" indent="0">
-              <a:lnSpc>
-                <a:spcPct val="100000"/>
-              </a:lnSpc>
-              <a:spcBef>
-                <a:spcPts val="600"/>
-              </a:spcBef>
-              <a:buFont typeface="Arial" panose="020B0604020202020204" pitchFamily="34" charset="0"/>
-              <a:buNone/>
-            </a:pPr>
-            <a:endParaRPr lang="nl-NL" sz="1400" b="1" dirty="0"/>
-          </a:p>
-        </p:txBody>
-      </p:sp>
-      <p:pic>
-        <p:nvPicPr>
-          <p:cNvPr id="5" name="Picture 4" descr="A screenshot of a computer&#10;&#10;Description automatically generated">
-            <a:extLst>
-              <a:ext uri="{FF2B5EF4-FFF2-40B4-BE49-F238E27FC236}">
-                <a16:creationId xmlns:a16="http://schemas.microsoft.com/office/drawing/2014/main" id="{7CBF1A83-01C2-F077-9F4B-A247040B0DD0}"/>
-              </a:ext>
-            </a:extLst>
-          </p:cNvPr>
-          <p:cNvPicPr>
-            <a:picLocks noChangeAspect="1"/>
-          </p:cNvPicPr>
-          <p:nvPr/>
-        </p:nvPicPr>
-        <p:blipFill>
-          <a:blip r:embed="rId2">
-            <a:extLst>
-              <a:ext uri="{28A0092B-C50C-407E-A947-70E740481C1C}">
-                <a14:useLocalDpi xmlns:a14="http://schemas.microsoft.com/office/drawing/2010/main" val="0"/>
-              </a:ext>
-            </a:extLst>
-          </a:blip>
-          <a:stretch>
-            <a:fillRect/>
-          </a:stretch>
-        </p:blipFill>
-        <p:spPr>
-          <a:xfrm>
-            <a:off x="4652938" y="1456267"/>
-            <a:ext cx="6700862" cy="3417922"/>
-          </a:xfrm>
-          <a:prstGeom prst="rect">
-            <a:avLst/>
-          </a:prstGeom>
-          <a:ln>
-            <a:solidFill>
-              <a:schemeClr val="tx1"/>
-            </a:solidFill>
-          </a:ln>
-        </p:spPr>
-      </p:pic>
-    </p:spTree>
-    <p:extLst>
-      <p:ext uri="{BB962C8B-B14F-4D97-AF65-F5344CB8AC3E}">
-        <p14:creationId xmlns:p14="http://schemas.microsoft.com/office/powerpoint/2010/main" val="13192849"/>
-      </p:ext>
-    </p:extLst>
-  </p:cSld>
-  <p:clrMapOvr>
-    <a:masterClrMapping/>
-  </p:clrMapOvr>
-</p:sld>
-</file>
-
-<file path=ppt/slides/slide39.xml><?xml version="1.0" encoding="utf-8"?>
-<p:sld xmlns:a="http://schemas.openxmlformats.org/drawingml/2006/main" xmlns:r="http://schemas.openxmlformats.org/officeDocument/2006/relationships" xmlns:p="http://schemas.openxmlformats.org/presentationml/2006/main">
-  <p:cSld>
-    <p:spTree>
-      <p:nvGrpSpPr>
-        <p:cNvPr id="1" name="">
-          <a:extLst>
-            <a:ext uri="{FF2B5EF4-FFF2-40B4-BE49-F238E27FC236}">
-              <a16:creationId xmlns:a16="http://schemas.microsoft.com/office/drawing/2014/main" id="{CF4B6063-BEB7-7383-638E-90AFF96E13C1}"/>
-            </a:ext>
-          </a:extLst>
-        </p:cNvPr>
-        <p:cNvGrpSpPr/>
-        <p:nvPr/>
-      </p:nvGrpSpPr>
-      <p:grpSpPr>
-        <a:xfrm>
-          <a:off x="0" y="0"/>
-          <a:ext cx="0" cy="0"/>
-          <a:chOff x="0" y="0"/>
-          <a:chExt cx="0" cy="0"/>
-        </a:xfrm>
-      </p:grpSpPr>
-      <p:sp>
-        <p:nvSpPr>
-          <p:cNvPr id="2" name="Title 1">
-            <a:extLst>
-              <a:ext uri="{FF2B5EF4-FFF2-40B4-BE49-F238E27FC236}">
-                <a16:creationId xmlns:a16="http://schemas.microsoft.com/office/drawing/2014/main" id="{5DD030C9-3A6F-5853-08FD-7F963B97E077}"/>
-              </a:ext>
-            </a:extLst>
-          </p:cNvPr>
-          <p:cNvSpPr>
-            <a:spLocks noGrp="1"/>
-          </p:cNvSpPr>
-          <p:nvPr>
-            <p:ph type="title"/>
-          </p:nvPr>
-        </p:nvSpPr>
-        <p:spPr>
-          <a:xfrm>
-            <a:off x="838200" y="365126"/>
-            <a:ext cx="10515600" cy="718608"/>
-          </a:xfrm>
-        </p:spPr>
-        <p:txBody>
-          <a:bodyPr>
-            <a:normAutofit/>
-          </a:bodyPr>
-          <a:lstStyle/>
-          <a:p>
-            <a:r>
-              <a:rPr lang="nl-NL" sz="3600" noProof="0" dirty="0"/>
-              <a:t>Boards</a:t>
-            </a:r>
-          </a:p>
-        </p:txBody>
-      </p:sp>
-      <p:sp>
-        <p:nvSpPr>
-          <p:cNvPr id="15" name="Content Placeholder 2">
-            <a:extLst>
-              <a:ext uri="{FF2B5EF4-FFF2-40B4-BE49-F238E27FC236}">
-                <a16:creationId xmlns:a16="http://schemas.microsoft.com/office/drawing/2014/main" id="{175688E2-2DD8-7204-4574-BF73A3C2897D}"/>
-              </a:ext>
-            </a:extLst>
-          </p:cNvPr>
-          <p:cNvSpPr txBox="1">
-            <a:spLocks/>
-          </p:cNvSpPr>
-          <p:nvPr/>
-        </p:nvSpPr>
-        <p:spPr>
-          <a:xfrm>
-            <a:off x="838200" y="1456267"/>
-            <a:ext cx="2921758" cy="4720696"/>
-          </a:xfrm>
-          <a:prstGeom prst="rect">
-            <a:avLst/>
-          </a:prstGeom>
-        </p:spPr>
-        <p:txBody>
-          <a:bodyPr vert="horz" lIns="91440" tIns="45720" rIns="91440" bIns="45720" rtlCol="0">
-            <a:noAutofit/>
-          </a:bodyPr>
-          <a:lstStyle>
-            <a:lvl1pPr marL="228600" indent="-228600" algn="l" defTabSz="914400" rtl="0" eaLnBrk="1" latinLnBrk="0" hangingPunct="1">
-              <a:lnSpc>
-                <a:spcPct val="90000"/>
-              </a:lnSpc>
-              <a:spcBef>
-                <a:spcPts val="1000"/>
-              </a:spcBef>
-              <a:buFont typeface="Arial" panose="020B0604020202020204" pitchFamily="34" charset="0"/>
-              <a:buChar char="•"/>
-              <a:defRPr sz="2800" kern="1200">
-                <a:solidFill>
-                  <a:schemeClr val="tx1"/>
-                </a:solidFill>
-                <a:latin typeface="+mn-lt"/>
-                <a:ea typeface="+mn-ea"/>
-                <a:cs typeface="+mn-cs"/>
-              </a:defRPr>
-            </a:lvl1pPr>
-            <a:lvl2pPr marL="685800" indent="-228600" algn="l" defTabSz="914400" rtl="0" eaLnBrk="1" latinLnBrk="0" hangingPunct="1">
-              <a:lnSpc>
-                <a:spcPct val="90000"/>
-              </a:lnSpc>
-              <a:spcBef>
-                <a:spcPts val="500"/>
-              </a:spcBef>
-              <a:buFont typeface="Arial" panose="020B0604020202020204" pitchFamily="34" charset="0"/>
-              <a:buChar char="•"/>
-              <a:defRPr sz="2400" kern="1200">
-                <a:solidFill>
-                  <a:schemeClr val="tx1"/>
-                </a:solidFill>
-                <a:latin typeface="+mn-lt"/>
-                <a:ea typeface="+mn-ea"/>
-                <a:cs typeface="+mn-cs"/>
-              </a:defRPr>
-            </a:lvl2pPr>
-            <a:lvl3pPr marL="1143000" indent="-228600" algn="l" defTabSz="914400" rtl="0" eaLnBrk="1" latinLnBrk="0" hangingPunct="1">
-              <a:lnSpc>
-                <a:spcPct val="90000"/>
-              </a:lnSpc>
-              <a:spcBef>
-                <a:spcPts val="500"/>
-              </a:spcBef>
-              <a:buFont typeface="Arial" panose="020B0604020202020204" pitchFamily="34" charset="0"/>
-              <a:buChar char="•"/>
-              <a:defRPr sz="2000" kern="1200">
-                <a:solidFill>
-                  <a:schemeClr val="tx1"/>
-                </a:solidFill>
-                <a:latin typeface="+mn-lt"/>
-                <a:ea typeface="+mn-ea"/>
-                <a:cs typeface="+mn-cs"/>
-              </a:defRPr>
-            </a:lvl3pPr>
-            <a:lvl4pPr marL="1600200" indent="-228600" algn="l" defTabSz="914400" rtl="0" eaLnBrk="1" latinLnBrk="0" hangingPunct="1">
-              <a:lnSpc>
-                <a:spcPct val="90000"/>
-              </a:lnSpc>
-              <a:spcBef>
-                <a:spcPts val="500"/>
-              </a:spcBef>
-              <a:buFont typeface="Arial" panose="020B0604020202020204" pitchFamily="34" charset="0"/>
-              <a:buChar char="•"/>
-              <a:defRPr sz="1800" kern="1200">
-                <a:solidFill>
-                  <a:schemeClr val="tx1"/>
-                </a:solidFill>
-                <a:latin typeface="+mn-lt"/>
-                <a:ea typeface="+mn-ea"/>
-                <a:cs typeface="+mn-cs"/>
-              </a:defRPr>
-            </a:lvl4pPr>
-            <a:lvl5pPr marL="2057400" indent="-228600" algn="l" defTabSz="914400" rtl="0" eaLnBrk="1" latinLnBrk="0" hangingPunct="1">
-              <a:lnSpc>
-                <a:spcPct val="90000"/>
-              </a:lnSpc>
-              <a:spcBef>
-                <a:spcPts val="500"/>
-              </a:spcBef>
-              <a:buFont typeface="Arial" panose="020B0604020202020204" pitchFamily="34" charset="0"/>
-              <a:buChar char="•"/>
-              <a:defRPr sz="1800" kern="1200">
-                <a:solidFill>
-                  <a:schemeClr val="tx1"/>
-                </a:solidFill>
-                <a:latin typeface="+mn-lt"/>
-                <a:ea typeface="+mn-ea"/>
-                <a:cs typeface="+mn-cs"/>
-              </a:defRPr>
-            </a:lvl5pPr>
-            <a:lvl6pPr marL="2514600" indent="-228600" algn="l" defTabSz="914400" rtl="0" eaLnBrk="1" latinLnBrk="0" hangingPunct="1">
-              <a:lnSpc>
-                <a:spcPct val="90000"/>
-              </a:lnSpc>
-              <a:spcBef>
-                <a:spcPts val="500"/>
-              </a:spcBef>
-              <a:buFont typeface="Arial" panose="020B0604020202020204" pitchFamily="34" charset="0"/>
-              <a:buChar char="•"/>
-              <a:defRPr sz="1800" kern="1200">
-                <a:solidFill>
-                  <a:schemeClr val="tx1"/>
-                </a:solidFill>
-                <a:latin typeface="+mn-lt"/>
-                <a:ea typeface="+mn-ea"/>
-                <a:cs typeface="+mn-cs"/>
-              </a:defRPr>
-            </a:lvl6pPr>
-            <a:lvl7pPr marL="2971800" indent="-228600" algn="l" defTabSz="914400" rtl="0" eaLnBrk="1" latinLnBrk="0" hangingPunct="1">
-              <a:lnSpc>
-                <a:spcPct val="90000"/>
-              </a:lnSpc>
-              <a:spcBef>
-                <a:spcPts val="500"/>
-              </a:spcBef>
-              <a:buFont typeface="Arial" panose="020B0604020202020204" pitchFamily="34" charset="0"/>
-              <a:buChar char="•"/>
-              <a:defRPr sz="1800" kern="1200">
-                <a:solidFill>
-                  <a:schemeClr val="tx1"/>
-                </a:solidFill>
-                <a:latin typeface="+mn-lt"/>
-                <a:ea typeface="+mn-ea"/>
-                <a:cs typeface="+mn-cs"/>
-              </a:defRPr>
-            </a:lvl7pPr>
-            <a:lvl8pPr marL="3429000" indent="-228600" algn="l" defTabSz="914400" rtl="0" eaLnBrk="1" latinLnBrk="0" hangingPunct="1">
-              <a:lnSpc>
-                <a:spcPct val="90000"/>
-              </a:lnSpc>
-              <a:spcBef>
-                <a:spcPts val="500"/>
-              </a:spcBef>
-              <a:buFont typeface="Arial" panose="020B0604020202020204" pitchFamily="34" charset="0"/>
-              <a:buChar char="•"/>
-              <a:defRPr sz="1800" kern="1200">
-                <a:solidFill>
-                  <a:schemeClr val="tx1"/>
-                </a:solidFill>
-                <a:latin typeface="+mn-lt"/>
-                <a:ea typeface="+mn-ea"/>
-                <a:cs typeface="+mn-cs"/>
-              </a:defRPr>
-            </a:lvl8pPr>
-            <a:lvl9pPr marL="3886200" indent="-228600" algn="l" defTabSz="914400" rtl="0" eaLnBrk="1" latinLnBrk="0" hangingPunct="1">
-              <a:lnSpc>
-                <a:spcPct val="90000"/>
-              </a:lnSpc>
-              <a:spcBef>
-                <a:spcPts val="500"/>
-              </a:spcBef>
-              <a:buFont typeface="Arial" panose="020B0604020202020204" pitchFamily="34" charset="0"/>
-              <a:buChar char="•"/>
-              <a:defRPr sz="1800" kern="1200">
-                <a:solidFill>
-                  <a:schemeClr val="tx1"/>
-                </a:solidFill>
-                <a:latin typeface="+mn-lt"/>
-                <a:ea typeface="+mn-ea"/>
-                <a:cs typeface="+mn-cs"/>
-              </a:defRPr>
-            </a:lvl9pPr>
-          </a:lstStyle>
-          <a:p>
-            <a:pPr marL="0" indent="0">
-              <a:lnSpc>
-                <a:spcPct val="100000"/>
-              </a:lnSpc>
-              <a:spcBef>
-                <a:spcPts val="600"/>
-              </a:spcBef>
-              <a:buFont typeface="Arial" panose="020B0604020202020204" pitchFamily="34" charset="0"/>
-              <a:buNone/>
-            </a:pPr>
-            <a:r>
-              <a:rPr lang="nl-NL" sz="1400" b="1" dirty="0" err="1"/>
-              <a:t>Verchillende</a:t>
-            </a:r>
-            <a:r>
-              <a:rPr lang="nl-NL" sz="1400" b="1" dirty="0"/>
-              <a:t> project types:</a:t>
-            </a:r>
-          </a:p>
-          <a:p>
-            <a:pPr>
-              <a:lnSpc>
-                <a:spcPct val="100000"/>
-              </a:lnSpc>
-              <a:spcBef>
-                <a:spcPts val="600"/>
-              </a:spcBef>
-              <a:buFontTx/>
-              <a:buChar char="-"/>
-            </a:pPr>
-            <a:r>
-              <a:rPr lang="nl-NL" sz="1400" dirty="0" err="1"/>
-              <a:t>Kanban</a:t>
-            </a:r>
-            <a:endParaRPr lang="nl-NL" sz="1400" dirty="0"/>
-          </a:p>
-          <a:p>
-            <a:pPr>
-              <a:lnSpc>
-                <a:spcPct val="100000"/>
-              </a:lnSpc>
-              <a:spcBef>
-                <a:spcPts val="600"/>
-              </a:spcBef>
-              <a:buFontTx/>
-              <a:buChar char="-"/>
-            </a:pPr>
-            <a:r>
-              <a:rPr lang="nl-NL" sz="1400" dirty="0"/>
-              <a:t>Sprints</a:t>
-            </a:r>
-          </a:p>
-          <a:p>
-            <a:pPr>
-              <a:lnSpc>
-                <a:spcPct val="100000"/>
-              </a:lnSpc>
-              <a:spcBef>
-                <a:spcPts val="600"/>
-              </a:spcBef>
-              <a:buFontTx/>
-              <a:buChar char="-"/>
-            </a:pPr>
-            <a:r>
-              <a:rPr lang="nl-NL" sz="1400" dirty="0"/>
-              <a:t>Bug </a:t>
-            </a:r>
-            <a:r>
-              <a:rPr lang="nl-NL" sz="1400" dirty="0" err="1"/>
-              <a:t>tracker</a:t>
-            </a:r>
-            <a:endParaRPr lang="nl-NL" sz="1400" dirty="0"/>
-          </a:p>
-          <a:p>
-            <a:pPr>
-              <a:lnSpc>
-                <a:spcPct val="100000"/>
-              </a:lnSpc>
-              <a:spcBef>
-                <a:spcPts val="600"/>
-              </a:spcBef>
-              <a:buFontTx/>
-              <a:buChar char="-"/>
-            </a:pPr>
-            <a:r>
-              <a:rPr lang="nl-NL" sz="1400" dirty="0" err="1"/>
-              <a:t>Roadmap</a:t>
-            </a:r>
-            <a:endParaRPr lang="nl-NL" sz="1400" dirty="0"/>
-          </a:p>
-          <a:p>
-            <a:pPr marL="0" indent="0">
-              <a:lnSpc>
-                <a:spcPct val="100000"/>
-              </a:lnSpc>
-              <a:spcBef>
-                <a:spcPts val="600"/>
-              </a:spcBef>
-              <a:buNone/>
-            </a:pPr>
-            <a:endParaRPr lang="nl-NL" sz="1400" dirty="0"/>
-          </a:p>
-          <a:p>
-            <a:pPr marL="0" indent="0">
-              <a:lnSpc>
-                <a:spcPct val="100000"/>
-              </a:lnSpc>
-              <a:spcBef>
-                <a:spcPts val="600"/>
-              </a:spcBef>
-              <a:buNone/>
-            </a:pPr>
-            <a:r>
-              <a:rPr lang="nl-NL" sz="1400" b="1" dirty="0"/>
-              <a:t>Project instellingen:</a:t>
-            </a:r>
-          </a:p>
-          <a:p>
-            <a:pPr>
-              <a:lnSpc>
-                <a:spcPct val="100000"/>
-              </a:lnSpc>
-              <a:spcBef>
-                <a:spcPts val="600"/>
-              </a:spcBef>
-              <a:buFontTx/>
-              <a:buChar char="-"/>
-            </a:pPr>
-            <a:r>
-              <a:rPr lang="nl-NL" sz="1400" dirty="0"/>
-              <a:t>Status voortgang</a:t>
-            </a:r>
-          </a:p>
-          <a:p>
-            <a:pPr>
-              <a:lnSpc>
-                <a:spcPct val="100000"/>
-              </a:lnSpc>
-              <a:spcBef>
-                <a:spcPts val="600"/>
-              </a:spcBef>
-              <a:buFontTx/>
-              <a:buChar char="-"/>
-            </a:pPr>
-            <a:r>
-              <a:rPr lang="nl-NL" sz="1400" dirty="0"/>
-              <a:t>Prioriteiten</a:t>
-            </a:r>
-          </a:p>
-          <a:p>
-            <a:pPr>
-              <a:lnSpc>
-                <a:spcPct val="100000"/>
-              </a:lnSpc>
-              <a:spcBef>
-                <a:spcPts val="600"/>
-              </a:spcBef>
-              <a:buFontTx/>
-              <a:buChar char="-"/>
-            </a:pPr>
-            <a:r>
-              <a:rPr lang="nl-NL" sz="1400" dirty="0"/>
-              <a:t>Aantal punten</a:t>
-            </a:r>
-          </a:p>
-          <a:p>
-            <a:pPr>
-              <a:lnSpc>
-                <a:spcPct val="100000"/>
-              </a:lnSpc>
-              <a:spcBef>
-                <a:spcPts val="600"/>
-              </a:spcBef>
-              <a:buFontTx/>
-              <a:buChar char="-"/>
-            </a:pPr>
-            <a:r>
-              <a:rPr lang="nl-NL" sz="1400" dirty="0"/>
-              <a:t>Sprints</a:t>
-            </a:r>
-          </a:p>
-          <a:p>
-            <a:pPr>
-              <a:lnSpc>
-                <a:spcPct val="100000"/>
-              </a:lnSpc>
-              <a:spcBef>
-                <a:spcPts val="600"/>
-              </a:spcBef>
-              <a:buFontTx/>
-              <a:buChar char="-"/>
-            </a:pPr>
-            <a:r>
-              <a:rPr lang="nl-NL" sz="1400" dirty="0"/>
-              <a:t>Et cetera</a:t>
-            </a:r>
-          </a:p>
-        </p:txBody>
-      </p:sp>
-      <p:pic>
-        <p:nvPicPr>
-          <p:cNvPr id="4" name="Picture 3" descr="A screenshot of a computer&#10;&#10;Description automatically generated">
-            <a:extLst>
-              <a:ext uri="{FF2B5EF4-FFF2-40B4-BE49-F238E27FC236}">
-                <a16:creationId xmlns:a16="http://schemas.microsoft.com/office/drawing/2014/main" id="{0FC7653E-444E-0293-457C-27DCB185E5F2}"/>
-              </a:ext>
-            </a:extLst>
-          </p:cNvPr>
-          <p:cNvPicPr>
-            <a:picLocks noChangeAspect="1"/>
-          </p:cNvPicPr>
-          <p:nvPr/>
-        </p:nvPicPr>
-        <p:blipFill>
-          <a:blip r:embed="rId2">
-            <a:extLst>
-              <a:ext uri="{28A0092B-C50C-407E-A947-70E740481C1C}">
-                <a14:useLocalDpi xmlns:a14="http://schemas.microsoft.com/office/drawing/2010/main" val="0"/>
-              </a:ext>
-            </a:extLst>
-          </a:blip>
-          <a:stretch>
-            <a:fillRect/>
-          </a:stretch>
-        </p:blipFill>
-        <p:spPr>
-          <a:xfrm>
-            <a:off x="4650376" y="1456267"/>
-            <a:ext cx="6703423" cy="4273491"/>
-          </a:xfrm>
-          <a:prstGeom prst="rect">
-            <a:avLst/>
-          </a:prstGeom>
-          <a:ln>
-            <a:solidFill>
-              <a:schemeClr val="tx1"/>
-            </a:solidFill>
-          </a:ln>
-        </p:spPr>
-      </p:pic>
-    </p:spTree>
-    <p:extLst>
-      <p:ext uri="{BB962C8B-B14F-4D97-AF65-F5344CB8AC3E}">
-        <p14:creationId xmlns:p14="http://schemas.microsoft.com/office/powerpoint/2010/main" val="4196414975"/>
       </p:ext>
     </p:extLst>
   </p:cSld>
@@ -24270,7 +24623,7 @@
         <p:cNvPr id="1" name="">
           <a:extLst>
             <a:ext uri="{FF2B5EF4-FFF2-40B4-BE49-F238E27FC236}">
-              <a16:creationId xmlns:a16="http://schemas.microsoft.com/office/drawing/2014/main" id="{BDFEA8A2-09C3-6C8E-58C3-68AE93B47193}"/>
+              <a16:creationId xmlns:a16="http://schemas.microsoft.com/office/drawing/2014/main" id="{702EC3AE-0169-3972-ED43-AD95D673F3AA}"/>
             </a:ext>
           </a:extLst>
         </p:cNvPr>
@@ -24290,7 +24643,7 @@
           <p:cNvPr id="2" name="Title 1">
             <a:extLst>
               <a:ext uri="{FF2B5EF4-FFF2-40B4-BE49-F238E27FC236}">
-                <a16:creationId xmlns:a16="http://schemas.microsoft.com/office/drawing/2014/main" id="{93B18F6F-5175-8AA3-408E-E13768652827}"/>
+                <a16:creationId xmlns:a16="http://schemas.microsoft.com/office/drawing/2014/main" id="{85BC5656-2A36-B53F-DB52-9C99DA4E6371}"/>
               </a:ext>
             </a:extLst>
           </p:cNvPr>
@@ -24314,9 +24667,10 @@
           <a:lstStyle/>
           <a:p>
             <a:r>
-              <a:rPr lang="nl-NL" sz="3600" noProof="0" dirty="0"/>
-              <a:t>Issue aanmaken</a:t>
-            </a:r>
+              <a:rPr lang="nl-NL" sz="3600" dirty="0"/>
+              <a:t>Project aanmaken</a:t>
+            </a:r>
+            <a:endParaRPr lang="nl-NL" sz="3600" noProof="0" dirty="0"/>
           </a:p>
         </p:txBody>
       </p:sp>
@@ -24325,7 +24679,7 @@
           <p:cNvPr id="15" name="Content Placeholder 2">
             <a:extLst>
               <a:ext uri="{FF2B5EF4-FFF2-40B4-BE49-F238E27FC236}">
-                <a16:creationId xmlns:a16="http://schemas.microsoft.com/office/drawing/2014/main" id="{4DCBF055-7428-2021-44E2-CCD550754DA2}"/>
+                <a16:creationId xmlns:a16="http://schemas.microsoft.com/office/drawing/2014/main" id="{8A98D2FF-672C-B65D-CD5F-9C29055B0C88}"/>
               </a:ext>
             </a:extLst>
           </p:cNvPr>
@@ -24345,7 +24699,7 @@
         </p:spPr>
         <p:txBody>
           <a:bodyPr vert="horz" lIns="91440" tIns="45720" rIns="91440" bIns="45720" rtlCol="0">
-            <a:noAutofit/>
+            <a:normAutofit/>
           </a:bodyPr>
           <a:lstStyle>
             <a:lvl1pPr marL="228600" indent="-228600" algn="l" defTabSz="914400" rtl="0" eaLnBrk="1" latinLnBrk="0" hangingPunct="1">
@@ -24519,12 +24873,11 @@
               <a:spcBef>
                 <a:spcPts val="600"/>
               </a:spcBef>
-              <a:buFont typeface="Arial" panose="020B0604020202020204" pitchFamily="34" charset="0"/>
               <a:buNone/>
             </a:pPr>
             <a:r>
               <a:rPr lang="nl-NL" sz="1400" dirty="0"/>
-              <a:t>Issues gekoppeld aan een repository en optioneel aan een project.</a:t>
+              <a:t>Het soort project kun je verder verfijnen via de instellingen:</a:t>
             </a:r>
           </a:p>
           <a:p>
@@ -24535,7 +24888,6 @@
               <a:spcBef>
                 <a:spcPts val="600"/>
               </a:spcBef>
-              <a:buFont typeface="Arial" panose="020B0604020202020204" pitchFamily="34" charset="0"/>
               <a:buNone/>
             </a:pPr>
             <a:endParaRPr lang="nl-NL" sz="1400" b="1" dirty="0"/>
@@ -24548,92 +24900,161 @@
               <a:spcBef>
                 <a:spcPts val="600"/>
               </a:spcBef>
-              <a:buFont typeface="Arial" panose="020B0604020202020204" pitchFamily="34" charset="0"/>
               <a:buNone/>
             </a:pPr>
             <a:r>
               <a:rPr lang="nl-NL" sz="1400" b="1" dirty="0"/>
-              <a:t>Via een repository:</a:t>
-            </a:r>
-          </a:p>
-          <a:p>
-            <a:pPr>
-              <a:lnSpc>
-                <a:spcPct val="100000"/>
-              </a:lnSpc>
-              <a:spcBef>
-                <a:spcPts val="600"/>
-              </a:spcBef>
-              <a:buFontTx/>
-              <a:buChar char="-"/>
+              <a:t>Status</a:t>
+            </a:r>
+          </a:p>
+          <a:p>
+            <a:pPr marL="0" indent="0">
+              <a:lnSpc>
+                <a:spcPct val="100000"/>
+              </a:lnSpc>
+              <a:spcBef>
+                <a:spcPts val="600"/>
+              </a:spcBef>
+              <a:buNone/>
             </a:pPr>
             <a:r>
               <a:rPr lang="nl-NL" sz="1400" dirty="0"/>
-              <a:t>Ga naar een repository.</a:t>
-            </a:r>
-          </a:p>
-          <a:p>
-            <a:pPr>
-              <a:lnSpc>
-                <a:spcPct val="100000"/>
-              </a:lnSpc>
-              <a:spcBef>
-                <a:spcPts val="600"/>
-              </a:spcBef>
-              <a:buFontTx/>
-              <a:buChar char="-"/>
+              <a:t>Definieer voortgangsstadia.</a:t>
+            </a:r>
+          </a:p>
+          <a:p>
+            <a:pPr marL="0" indent="0">
+              <a:lnSpc>
+                <a:spcPct val="100000"/>
+              </a:lnSpc>
+              <a:spcBef>
+                <a:spcPts val="600"/>
+              </a:spcBef>
+              <a:buNone/>
+            </a:pPr>
+            <a:endParaRPr lang="nl-NL" sz="1400" b="1" dirty="0"/>
+          </a:p>
+          <a:p>
+            <a:pPr marL="0" indent="0">
+              <a:lnSpc>
+                <a:spcPct val="100000"/>
+              </a:lnSpc>
+              <a:spcBef>
+                <a:spcPts val="600"/>
+              </a:spcBef>
+              <a:buNone/>
+            </a:pPr>
+            <a:r>
+              <a:rPr lang="nl-NL" sz="1400" b="1" dirty="0"/>
+              <a:t>Prioriteiten</a:t>
+            </a:r>
+          </a:p>
+          <a:p>
+            <a:pPr marL="0" indent="0">
+              <a:lnSpc>
+                <a:spcPct val="100000"/>
+              </a:lnSpc>
+              <a:spcBef>
+                <a:spcPts val="600"/>
+              </a:spcBef>
+              <a:buNone/>
             </a:pPr>
             <a:r>
               <a:rPr lang="nl-NL" sz="1400" dirty="0"/>
-              <a:t>Klik bovenaan op Issues.</a:t>
-            </a:r>
-          </a:p>
-          <a:p>
-            <a:pPr>
-              <a:lnSpc>
-                <a:spcPct val="100000"/>
-              </a:lnSpc>
-              <a:spcBef>
-                <a:spcPts val="600"/>
-              </a:spcBef>
-              <a:buFontTx/>
-              <a:buChar char="-"/>
+              <a:t>Definieer prioriteiten</a:t>
+            </a:r>
+          </a:p>
+          <a:p>
+            <a:pPr marL="0" indent="0">
+              <a:lnSpc>
+                <a:spcPct val="100000"/>
+              </a:lnSpc>
+              <a:spcBef>
+                <a:spcPts val="600"/>
+              </a:spcBef>
+              <a:buNone/>
+            </a:pPr>
+            <a:endParaRPr lang="nl-NL" sz="1400" dirty="0"/>
+          </a:p>
+          <a:p>
+            <a:pPr marL="0" indent="0">
+              <a:lnSpc>
+                <a:spcPct val="100000"/>
+              </a:lnSpc>
+              <a:spcBef>
+                <a:spcPts val="600"/>
+              </a:spcBef>
+              <a:buNone/>
+            </a:pPr>
+            <a:r>
+              <a:rPr lang="nl-NL" sz="1400" b="1" dirty="0" err="1"/>
+              <a:t>Size</a:t>
+            </a:r>
+            <a:r>
+              <a:rPr lang="nl-NL" sz="1400" b="1" dirty="0"/>
+              <a:t> / </a:t>
+            </a:r>
+            <a:r>
+              <a:rPr lang="nl-NL" sz="1400" b="1" dirty="0" err="1"/>
+              <a:t>Estimate</a:t>
+            </a:r>
+            <a:endParaRPr lang="nl-NL" sz="1400" b="1" dirty="0"/>
+          </a:p>
+          <a:p>
+            <a:pPr marL="0" indent="0">
+              <a:lnSpc>
+                <a:spcPct val="100000"/>
+              </a:lnSpc>
+              <a:spcBef>
+                <a:spcPts val="600"/>
+              </a:spcBef>
+              <a:buNone/>
             </a:pPr>
             <a:r>
               <a:rPr lang="nl-NL" sz="1400" dirty="0"/>
-              <a:t>Klik rechtsboven op New Issue.</a:t>
-            </a:r>
-          </a:p>
-          <a:p>
-            <a:pPr>
-              <a:lnSpc>
-                <a:spcPct val="100000"/>
-              </a:lnSpc>
-              <a:spcBef>
-                <a:spcPts val="600"/>
-              </a:spcBef>
-              <a:buFontTx/>
-              <a:buChar char="-"/>
+              <a:t>Inschatting hoeveelheid werk.</a:t>
+            </a:r>
+          </a:p>
+          <a:p>
+            <a:pPr marL="0" indent="0">
+              <a:lnSpc>
+                <a:spcPct val="100000"/>
+              </a:lnSpc>
+              <a:spcBef>
+                <a:spcPts val="600"/>
+              </a:spcBef>
+              <a:buNone/>
+            </a:pPr>
+            <a:endParaRPr lang="nl-NL" sz="1400" dirty="0"/>
+          </a:p>
+          <a:p>
+            <a:pPr marL="0" indent="0">
+              <a:lnSpc>
+                <a:spcPct val="100000"/>
+              </a:lnSpc>
+              <a:spcBef>
+                <a:spcPts val="600"/>
+              </a:spcBef>
+              <a:buNone/>
+            </a:pPr>
+            <a:r>
+              <a:rPr lang="nl-NL" sz="1400" b="1" dirty="0"/>
+              <a:t>Iteration</a:t>
+            </a:r>
+          </a:p>
+          <a:p>
+            <a:pPr marL="0" indent="0">
+              <a:lnSpc>
+                <a:spcPct val="100000"/>
+              </a:lnSpc>
+              <a:spcBef>
+                <a:spcPts val="600"/>
+              </a:spcBef>
+              <a:buNone/>
             </a:pPr>
             <a:r>
               <a:rPr lang="nl-NL" sz="1400" dirty="0"/>
-              <a:t>Vul alle gegevens in.</a:t>
-            </a:r>
-          </a:p>
-          <a:p>
-            <a:pPr>
-              <a:lnSpc>
-                <a:spcPct val="100000"/>
-              </a:lnSpc>
-              <a:spcBef>
-                <a:spcPts val="600"/>
-              </a:spcBef>
-              <a:buFontTx/>
-              <a:buChar char="-"/>
-            </a:pPr>
-            <a:r>
-              <a:rPr lang="nl-NL" sz="1400" dirty="0"/>
-              <a:t>Kies project in rechter menu</a:t>
+              <a:t>Aanmaken van sprints.</a:t>
             </a:r>
           </a:p>
           <a:p>
@@ -24644,43 +25065,19 @@
               <a:spcBef>
                 <a:spcPts val="600"/>
               </a:spcBef>
-              <a:buNone/>
-            </a:pPr>
-            <a:endParaRPr lang="nl-NL" sz="1400" dirty="0"/>
-          </a:p>
-          <a:p>
-            <a:pPr marL="0" indent="0">
-              <a:lnSpc>
-                <a:spcPct val="100000"/>
-              </a:lnSpc>
-              <a:spcBef>
-                <a:spcPts val="600"/>
-              </a:spcBef>
-              <a:buNone/>
-            </a:pPr>
-            <a:endParaRPr lang="nl-NL" sz="1400" dirty="0"/>
-          </a:p>
-          <a:p>
-            <a:pPr marL="0" indent="0">
-              <a:lnSpc>
-                <a:spcPct val="100000"/>
-              </a:lnSpc>
-              <a:spcBef>
-                <a:spcPts val="600"/>
-              </a:spcBef>
-              <a:buFont typeface="Arial" panose="020B0604020202020204" pitchFamily="34" charset="0"/>
-              <a:buNone/>
-            </a:pPr>
-            <a:endParaRPr lang="nl-NL" sz="1400" dirty="0"/>
+              <a:buFont typeface="Arial" panose="020B0604020202020204" pitchFamily="34" charset="0"/>
+              <a:buNone/>
+            </a:pPr>
+            <a:endParaRPr lang="nl-NL" sz="1400" b="1" dirty="0"/>
           </a:p>
         </p:txBody>
       </p:sp>
       <p:pic>
         <p:nvPicPr>
-          <p:cNvPr id="4" name="Picture 3" descr="A screenshot of a computer&#10;&#10;Description automatically generated">
-            <a:extLst>
-              <a:ext uri="{FF2B5EF4-FFF2-40B4-BE49-F238E27FC236}">
-                <a16:creationId xmlns:a16="http://schemas.microsoft.com/office/drawing/2014/main" id="{336BBA03-D9DD-D985-58E3-1D280C65BF79}"/>
+          <p:cNvPr id="5" name="Picture 4" descr="A screenshot of a computer&#10;&#10;Description automatically generated">
+            <a:extLst>
+              <a:ext uri="{FF2B5EF4-FFF2-40B4-BE49-F238E27FC236}">
+                <a16:creationId xmlns:a16="http://schemas.microsoft.com/office/drawing/2014/main" id="{7CBF1A83-01C2-F077-9F4B-A247040B0DD0}"/>
               </a:ext>
             </a:extLst>
           </p:cNvPr>
@@ -24703,8 +25100,8 @@
         </p:blipFill>
         <p:spPr>
           <a:xfrm>
-            <a:off x="4488300" y="1456267"/>
-            <a:ext cx="6865500" cy="3003656"/>
+            <a:off x="4652938" y="1456267"/>
+            <a:ext cx="6700862" cy="3417922"/>
           </a:xfrm>
           <a:prstGeom prst="rect">
             <a:avLst/>
@@ -24716,62 +25113,10 @@
           </a:ln>
         </p:spPr>
       </p:pic>
-      <p:sp>
-        <p:nvSpPr>
-          <p:cNvPr id="6" name="Rectangle 5">
-            <a:extLst>
-              <a:ext uri="{FF2B5EF4-FFF2-40B4-BE49-F238E27FC236}">
-                <a16:creationId xmlns:a16="http://schemas.microsoft.com/office/drawing/2014/main" id="{78D13A21-0E8F-2EB0-324B-512B504F9D81}"/>
-              </a:ext>
-            </a:extLst>
-          </p:cNvPr>
-          <p:cNvSpPr/>
-          <p:nvPr/>
-        </p:nvSpPr>
-        <p:spPr>
-          <a:xfrm>
-            <a:off x="9555480" y="2429691"/>
-            <a:ext cx="1737360" cy="1208315"/>
-          </a:xfrm>
-          <a:prstGeom prst="rect">
-            <a:avLst/>
-          </a:prstGeom>
-          <a:noFill/>
-          <a:ln w="12700">
-            <a:solidFill>
-              <a:schemeClr val="accent2"/>
-            </a:solidFill>
-          </a:ln>
-        </p:spPr>
-        <p:style>
-          <a:lnRef idx="2">
-            <a:schemeClr val="accent1">
-              <a:shade val="15000"/>
-            </a:schemeClr>
-          </a:lnRef>
-          <a:fillRef idx="1">
-            <a:schemeClr val="accent1"/>
-          </a:fillRef>
-          <a:effectRef idx="0">
-            <a:schemeClr val="accent1"/>
-          </a:effectRef>
-          <a:fontRef idx="minor">
-            <a:schemeClr val="lt1"/>
-          </a:fontRef>
-        </p:style>
-        <p:txBody>
-          <a:bodyPr rtlCol="0" anchor="ctr"/>
-          <a:lstStyle/>
-          <a:p>
-            <a:pPr algn="ctr"/>
-            <a:endParaRPr lang="nl-NL"/>
-          </a:p>
-        </p:txBody>
-      </p:sp>
     </p:spTree>
     <p:extLst>
       <p:ext uri="{BB962C8B-B14F-4D97-AF65-F5344CB8AC3E}">
-        <p14:creationId xmlns:p14="http://schemas.microsoft.com/office/powerpoint/2010/main" val="1181346886"/>
+        <p14:creationId xmlns:p14="http://schemas.microsoft.com/office/powerpoint/2010/main" val="13192849"/>
       </p:ext>
     </p:extLst>
   </p:cSld>
@@ -24789,7 +25134,7 @@
         <p:cNvPr id="1" name="">
           <a:extLst>
             <a:ext uri="{FF2B5EF4-FFF2-40B4-BE49-F238E27FC236}">
-              <a16:creationId xmlns:a16="http://schemas.microsoft.com/office/drawing/2014/main" id="{81E6E7BF-D0E7-8CC9-A652-5EFD5B67776B}"/>
+              <a16:creationId xmlns:a16="http://schemas.microsoft.com/office/drawing/2014/main" id="{CF4B6063-BEB7-7383-638E-90AFF96E13C1}"/>
             </a:ext>
           </a:extLst>
         </p:cNvPr>
@@ -24809,7 +25154,7 @@
           <p:cNvPr id="2" name="Title 1">
             <a:extLst>
               <a:ext uri="{FF2B5EF4-FFF2-40B4-BE49-F238E27FC236}">
-                <a16:creationId xmlns:a16="http://schemas.microsoft.com/office/drawing/2014/main" id="{120501EB-C797-DCA7-052E-57256E1238D9}"/>
+                <a16:creationId xmlns:a16="http://schemas.microsoft.com/office/drawing/2014/main" id="{5DD030C9-3A6F-5853-08FD-7F963B97E077}"/>
               </a:ext>
             </a:extLst>
           </p:cNvPr>
@@ -24834,7 +25179,7 @@
           <a:p>
             <a:r>
               <a:rPr lang="nl-NL" sz="3600" noProof="0" dirty="0"/>
-              <a:t>Issue aanmaken</a:t>
+              <a:t>Views</a:t>
             </a:r>
           </a:p>
         </p:txBody>
@@ -24844,7 +25189,7 @@
           <p:cNvPr id="15" name="Content Placeholder 2">
             <a:extLst>
               <a:ext uri="{FF2B5EF4-FFF2-40B4-BE49-F238E27FC236}">
-                <a16:creationId xmlns:a16="http://schemas.microsoft.com/office/drawing/2014/main" id="{861D6860-F466-E416-744A-C4E0E758D132}"/>
+                <a16:creationId xmlns:a16="http://schemas.microsoft.com/office/drawing/2014/main" id="{175688E2-2DD8-7204-4574-BF73A3C2897D}"/>
               </a:ext>
             </a:extLst>
           </p:cNvPr>
@@ -24856,7 +25201,7 @@
         <p:spPr>
           <a:xfrm>
             <a:off x="838200" y="1456267"/>
-            <a:ext cx="2921758" cy="4720696"/>
+            <a:ext cx="3440906" cy="4720696"/>
           </a:xfrm>
           <a:prstGeom prst="rect">
             <a:avLst/>
@@ -25043,7 +25388,7 @@
             </a:pPr>
             <a:r>
               <a:rPr lang="nl-NL" sz="1400" dirty="0"/>
-              <a:t>Issues gekoppeld aan een repository en optioneel aan een project.</a:t>
+              <a:t>Geven taken op overzichtelijke wijze weer:</a:t>
             </a:r>
           </a:p>
           <a:p>
@@ -25057,6 +25402,23 @@
               <a:buFont typeface="Arial" panose="020B0604020202020204" pitchFamily="34" charset="0"/>
               <a:buNone/>
             </a:pPr>
+            <a:endParaRPr lang="nl-NL" sz="1400" dirty="0"/>
+          </a:p>
+          <a:p>
+            <a:pPr marL="0" indent="0">
+              <a:lnSpc>
+                <a:spcPct val="100000"/>
+              </a:lnSpc>
+              <a:spcBef>
+                <a:spcPts val="600"/>
+              </a:spcBef>
+              <a:buFont typeface="Arial" panose="020B0604020202020204" pitchFamily="34" charset="0"/>
+              <a:buNone/>
+            </a:pPr>
+            <a:r>
+              <a:rPr lang="nl-NL" sz="1400" b="1" dirty="0" err="1"/>
+              <a:t>Backlog</a:t>
+            </a:r>
             <a:endParaRPr lang="nl-NL" sz="1400" b="1" dirty="0"/>
           </a:p>
           <a:p>
@@ -25071,188 +25433,163 @@
               <a:buNone/>
             </a:pPr>
             <a:r>
+              <a:rPr lang="nl-NL" sz="1400" dirty="0"/>
+              <a:t>Alle taken ingedeeld op voortgangsstadium.</a:t>
+            </a:r>
+          </a:p>
+          <a:p>
+            <a:pPr marL="0" indent="0">
+              <a:lnSpc>
+                <a:spcPct val="100000"/>
+              </a:lnSpc>
+              <a:spcBef>
+                <a:spcPts val="600"/>
+              </a:spcBef>
+              <a:buFont typeface="Arial" panose="020B0604020202020204" pitchFamily="34" charset="0"/>
+              <a:buNone/>
+            </a:pPr>
+            <a:endParaRPr lang="nl-NL" sz="1400" dirty="0"/>
+          </a:p>
+          <a:p>
+            <a:pPr marL="0" indent="0">
+              <a:lnSpc>
+                <a:spcPct val="100000"/>
+              </a:lnSpc>
+              <a:spcBef>
+                <a:spcPts val="600"/>
+              </a:spcBef>
+              <a:buFont typeface="Arial" panose="020B0604020202020204" pitchFamily="34" charset="0"/>
+              <a:buNone/>
+            </a:pPr>
+            <a:r>
               <a:rPr lang="nl-NL" sz="1400" b="1" dirty="0"/>
-              <a:t>Via een project</a:t>
-            </a:r>
-          </a:p>
-          <a:p>
-            <a:pPr>
-              <a:lnSpc>
-                <a:spcPct val="100000"/>
-              </a:lnSpc>
-              <a:spcBef>
-                <a:spcPts val="600"/>
-              </a:spcBef>
-              <a:buFontTx/>
-              <a:buChar char="-"/>
+              <a:t>Team </a:t>
+            </a:r>
+            <a:r>
+              <a:rPr lang="nl-NL" sz="1400" b="1" dirty="0" err="1"/>
+              <a:t>capacity</a:t>
+            </a:r>
+            <a:endParaRPr lang="nl-NL" sz="1400" dirty="0"/>
+          </a:p>
+          <a:p>
+            <a:pPr marL="0" indent="0">
+              <a:lnSpc>
+                <a:spcPct val="100000"/>
+              </a:lnSpc>
+              <a:spcBef>
+                <a:spcPts val="600"/>
+              </a:spcBef>
+              <a:buFont typeface="Arial" panose="020B0604020202020204" pitchFamily="34" charset="0"/>
+              <a:buNone/>
             </a:pPr>
             <a:r>
               <a:rPr lang="nl-NL" sz="1400" dirty="0"/>
-              <a:t>Ga naar het project.</a:t>
-            </a:r>
-          </a:p>
-          <a:p>
-            <a:pPr>
-              <a:lnSpc>
-                <a:spcPct val="100000"/>
-              </a:lnSpc>
-              <a:spcBef>
-                <a:spcPts val="600"/>
-              </a:spcBef>
-              <a:buFontTx/>
-              <a:buChar char="-"/>
+              <a:t>Taken opgesplitst naar team leden.</a:t>
+            </a:r>
+          </a:p>
+          <a:p>
+            <a:pPr marL="0" indent="0">
+              <a:lnSpc>
+                <a:spcPct val="100000"/>
+              </a:lnSpc>
+              <a:spcBef>
+                <a:spcPts val="600"/>
+              </a:spcBef>
+              <a:buFont typeface="Arial" panose="020B0604020202020204" pitchFamily="34" charset="0"/>
+              <a:buNone/>
+            </a:pPr>
+            <a:endParaRPr lang="nl-NL" sz="1400" dirty="0"/>
+          </a:p>
+          <a:p>
+            <a:pPr marL="0" indent="0">
+              <a:lnSpc>
+                <a:spcPct val="100000"/>
+              </a:lnSpc>
+              <a:spcBef>
+                <a:spcPts val="600"/>
+              </a:spcBef>
+              <a:buFont typeface="Arial" panose="020B0604020202020204" pitchFamily="34" charset="0"/>
+              <a:buNone/>
+            </a:pPr>
+            <a:r>
+              <a:rPr lang="nl-NL" sz="1400" b="1" dirty="0" err="1"/>
+              <a:t>Current</a:t>
+            </a:r>
+            <a:r>
+              <a:rPr lang="nl-NL" sz="1400" b="1" dirty="0"/>
+              <a:t> iteration</a:t>
+            </a:r>
+          </a:p>
+          <a:p>
+            <a:pPr marL="0" indent="0">
+              <a:lnSpc>
+                <a:spcPct val="100000"/>
+              </a:lnSpc>
+              <a:spcBef>
+                <a:spcPts val="600"/>
+              </a:spcBef>
+              <a:buFont typeface="Arial" panose="020B0604020202020204" pitchFamily="34" charset="0"/>
+              <a:buNone/>
             </a:pPr>
             <a:r>
               <a:rPr lang="nl-NL" sz="1400" dirty="0"/>
-              <a:t>Klik op </a:t>
-            </a:r>
-            <a:r>
-              <a:rPr lang="nl-NL" sz="1400" dirty="0" err="1"/>
-              <a:t>Backlog</a:t>
-            </a:r>
+              <a:t>Taken in huidige sprint ingedeeld op voortgangsstadium.</a:t>
+            </a:r>
+          </a:p>
+          <a:p>
+            <a:pPr marL="0" indent="0">
+              <a:lnSpc>
+                <a:spcPct val="100000"/>
+              </a:lnSpc>
+              <a:spcBef>
+                <a:spcPts val="600"/>
+              </a:spcBef>
+              <a:buFont typeface="Arial" panose="020B0604020202020204" pitchFamily="34" charset="0"/>
+              <a:buNone/>
+            </a:pPr>
+            <a:endParaRPr lang="nl-NL" sz="1400" dirty="0"/>
+          </a:p>
+          <a:p>
+            <a:pPr marL="0" indent="0">
+              <a:lnSpc>
+                <a:spcPct val="100000"/>
+              </a:lnSpc>
+              <a:spcBef>
+                <a:spcPts val="600"/>
+              </a:spcBef>
+              <a:buFont typeface="Arial" panose="020B0604020202020204" pitchFamily="34" charset="0"/>
+              <a:buNone/>
+            </a:pPr>
+            <a:r>
+              <a:rPr lang="nl-NL" sz="1400" b="1" dirty="0" err="1"/>
+              <a:t>Roadmap</a:t>
+            </a:r>
+            <a:endParaRPr lang="nl-NL" sz="1400" dirty="0"/>
+          </a:p>
+          <a:p>
+            <a:pPr marL="0" indent="0">
+              <a:lnSpc>
+                <a:spcPct val="100000"/>
+              </a:lnSpc>
+              <a:spcBef>
+                <a:spcPts val="600"/>
+              </a:spcBef>
+              <a:buFont typeface="Arial" panose="020B0604020202020204" pitchFamily="34" charset="0"/>
+              <a:buNone/>
+            </a:pPr>
             <a:r>
               <a:rPr lang="nl-NL" sz="1400" dirty="0"/>
-              <a:t>.</a:t>
-            </a:r>
-          </a:p>
-          <a:p>
-            <a:pPr>
-              <a:lnSpc>
-                <a:spcPct val="100000"/>
-              </a:lnSpc>
-              <a:spcBef>
-                <a:spcPts val="600"/>
-              </a:spcBef>
-              <a:buFontTx/>
-              <a:buChar char="-"/>
-            </a:pPr>
-            <a:r>
-              <a:rPr lang="nl-NL" sz="1400" dirty="0"/>
-              <a:t>Klik onderaan op + </a:t>
-            </a:r>
-            <a:r>
-              <a:rPr lang="nl-NL" sz="1400" dirty="0" err="1"/>
-              <a:t>Add</a:t>
-            </a:r>
-            <a:r>
-              <a:rPr lang="nl-NL" sz="1400" dirty="0"/>
-              <a:t> item.</a:t>
-            </a:r>
-          </a:p>
-          <a:p>
-            <a:pPr>
-              <a:lnSpc>
-                <a:spcPct val="100000"/>
-              </a:lnSpc>
-              <a:spcBef>
-                <a:spcPts val="600"/>
-              </a:spcBef>
-              <a:buFontTx/>
-              <a:buChar char="-"/>
-            </a:pPr>
-            <a:r>
-              <a:rPr lang="nl-NL" sz="1400" dirty="0"/>
-              <a:t>Kies </a:t>
-            </a:r>
-            <a:r>
-              <a:rPr lang="nl-NL" sz="1400" dirty="0" err="1"/>
-              <a:t>Create</a:t>
-            </a:r>
-            <a:r>
-              <a:rPr lang="nl-NL" sz="1400" dirty="0"/>
-              <a:t> new item.</a:t>
-            </a:r>
-          </a:p>
-          <a:p>
-            <a:pPr>
-              <a:lnSpc>
-                <a:spcPct val="100000"/>
-              </a:lnSpc>
-              <a:spcBef>
-                <a:spcPts val="600"/>
-              </a:spcBef>
-              <a:buFontTx/>
-              <a:buChar char="-"/>
-            </a:pPr>
-            <a:r>
-              <a:rPr lang="nl-NL" sz="1400" dirty="0"/>
-              <a:t>Kies het repository.</a:t>
-            </a:r>
-          </a:p>
-          <a:p>
-            <a:pPr>
-              <a:lnSpc>
-                <a:spcPct val="100000"/>
-              </a:lnSpc>
-              <a:spcBef>
-                <a:spcPts val="600"/>
-              </a:spcBef>
-              <a:buFontTx/>
-              <a:buChar char="-"/>
-            </a:pPr>
-            <a:r>
-              <a:rPr lang="nl-NL" sz="1400" dirty="0"/>
-              <a:t>Vul de gegevens in.</a:t>
-            </a:r>
-          </a:p>
-          <a:p>
-            <a:pPr marL="0" indent="0">
-              <a:lnSpc>
-                <a:spcPct val="100000"/>
-              </a:lnSpc>
-              <a:spcBef>
-                <a:spcPts val="600"/>
-              </a:spcBef>
-              <a:buFont typeface="Arial" panose="020B0604020202020204" pitchFamily="34" charset="0"/>
-              <a:buNone/>
-            </a:pPr>
-            <a:endParaRPr lang="nl-NL" sz="1400" dirty="0"/>
-          </a:p>
-          <a:p>
-            <a:pPr marL="0" indent="0">
-              <a:lnSpc>
-                <a:spcPct val="100000"/>
-              </a:lnSpc>
-              <a:spcBef>
-                <a:spcPts val="600"/>
-              </a:spcBef>
-              <a:buNone/>
-            </a:pPr>
-            <a:endParaRPr lang="nl-NL" sz="1400" dirty="0"/>
-          </a:p>
-          <a:p>
-            <a:pPr marL="0" indent="0">
-              <a:lnSpc>
-                <a:spcPct val="100000"/>
-              </a:lnSpc>
-              <a:spcBef>
-                <a:spcPts val="600"/>
-              </a:spcBef>
-              <a:buNone/>
-            </a:pPr>
-            <a:endParaRPr lang="nl-NL" sz="1400" dirty="0"/>
-          </a:p>
-          <a:p>
-            <a:pPr marL="0" indent="0">
-              <a:lnSpc>
-                <a:spcPct val="100000"/>
-              </a:lnSpc>
-              <a:spcBef>
-                <a:spcPts val="600"/>
-              </a:spcBef>
-              <a:buFont typeface="Arial" panose="020B0604020202020204" pitchFamily="34" charset="0"/>
-              <a:buNone/>
-            </a:pPr>
-            <a:endParaRPr lang="nl-NL" sz="1400" dirty="0"/>
+              <a:t>Taken geplot op een tijdslijn.</a:t>
+            </a:r>
           </a:p>
         </p:txBody>
       </p:sp>
       <p:pic>
         <p:nvPicPr>
-          <p:cNvPr id="5" name="Picture 4" descr="A screenshot of a computer&#10;&#10;Description automatically generated">
-            <a:extLst>
-              <a:ext uri="{FF2B5EF4-FFF2-40B4-BE49-F238E27FC236}">
-                <a16:creationId xmlns:a16="http://schemas.microsoft.com/office/drawing/2014/main" id="{9ECEBFEB-DC73-4239-9299-BA8512B3DAB1}"/>
+          <p:cNvPr id="4" name="Picture 3" descr="A screenshot of a computer&#10;&#10;Description automatically generated">
+            <a:extLst>
+              <a:ext uri="{FF2B5EF4-FFF2-40B4-BE49-F238E27FC236}">
+                <a16:creationId xmlns:a16="http://schemas.microsoft.com/office/drawing/2014/main" id="{0FC7653E-444E-0293-457C-27DCB185E5F2}"/>
               </a:ext>
             </a:extLst>
           </p:cNvPr>
@@ -25275,8 +25612,8 @@
         </p:blipFill>
         <p:spPr>
           <a:xfrm>
-            <a:off x="6294194" y="1456267"/>
-            <a:ext cx="5059606" cy="4707072"/>
+            <a:off x="4650376" y="1456267"/>
+            <a:ext cx="6703423" cy="4273491"/>
           </a:xfrm>
           <a:prstGeom prst="rect">
             <a:avLst/>
@@ -25288,51 +25625,10 @@
           </a:ln>
         </p:spPr>
       </p:pic>
-      <p:cxnSp>
-        <p:nvCxnSpPr>
-          <p:cNvPr id="7" name="Straight Connector 6">
-            <a:extLst>
-              <a:ext uri="{FF2B5EF4-FFF2-40B4-BE49-F238E27FC236}">
-                <a16:creationId xmlns:a16="http://schemas.microsoft.com/office/drawing/2014/main" id="{4B764C4F-269F-6E95-F6DA-6AFA7D47A2B4}"/>
-              </a:ext>
-            </a:extLst>
-          </p:cNvPr>
-          <p:cNvCxnSpPr/>
-          <p:nvPr/>
-        </p:nvCxnSpPr>
-        <p:spPr>
-          <a:xfrm>
-            <a:off x="6453051" y="2142309"/>
-            <a:ext cx="1822269" cy="0"/>
-          </a:xfrm>
-          <a:prstGeom prst="line">
-            <a:avLst/>
-          </a:prstGeom>
-          <a:ln>
-            <a:solidFill>
-              <a:schemeClr val="accent2"/>
-            </a:solidFill>
-          </a:ln>
-        </p:spPr>
-        <p:style>
-          <a:lnRef idx="2">
-            <a:schemeClr val="accent2"/>
-          </a:lnRef>
-          <a:fillRef idx="0">
-            <a:schemeClr val="accent2"/>
-          </a:fillRef>
-          <a:effectRef idx="1">
-            <a:schemeClr val="accent2"/>
-          </a:effectRef>
-          <a:fontRef idx="minor">
-            <a:schemeClr val="tx1"/>
-          </a:fontRef>
-        </p:style>
-      </p:cxnSp>
     </p:spTree>
     <p:extLst>
       <p:ext uri="{BB962C8B-B14F-4D97-AF65-F5344CB8AC3E}">
-        <p14:creationId xmlns:p14="http://schemas.microsoft.com/office/powerpoint/2010/main" val="2473046667"/>
+        <p14:creationId xmlns:p14="http://schemas.microsoft.com/office/powerpoint/2010/main" val="4196414975"/>
       </p:ext>
     </p:extLst>
   </p:cSld>
@@ -27369,7 +27665,7 @@
             </a:pPr>
             <a:r>
               <a:rPr lang="nl-NL" sz="1800" dirty="0"/>
-              <a:t>Klik rechtsboven op [New pull </a:t>
+              <a:t>Klik op [New pull </a:t>
             </a:r>
             <a:r>
               <a:rPr lang="nl-NL" sz="1800" dirty="0" err="1"/>
@@ -27379,50 +27675,6 @@
               <a:rPr lang="nl-NL" sz="1800" dirty="0"/>
               <a:t>].</a:t>
             </a:r>
-          </a:p>
-          <a:p>
-            <a:pPr marL="342900" indent="-342900">
-              <a:lnSpc>
-                <a:spcPct val="150000"/>
-              </a:lnSpc>
-              <a:spcBef>
-                <a:spcPts val="600"/>
-              </a:spcBef>
-              <a:buFont typeface="Arial" panose="020B0604020202020204" pitchFamily="34" charset="0"/>
-              <a:buAutoNum type="arabicPeriod"/>
-            </a:pPr>
-            <a:r>
-              <a:rPr lang="nl-NL" sz="1800" dirty="0"/>
-              <a:t>Klik op [</a:t>
-            </a:r>
-            <a:r>
-              <a:rPr lang="nl-NL" sz="1800" dirty="0" err="1"/>
-              <a:t>Create</a:t>
-            </a:r>
-            <a:r>
-              <a:rPr lang="nl-NL" sz="1800" dirty="0"/>
-              <a:t> pull </a:t>
-            </a:r>
-            <a:r>
-              <a:rPr lang="nl-NL" sz="1800" dirty="0" err="1"/>
-              <a:t>request</a:t>
-            </a:r>
-            <a:r>
-              <a:rPr lang="nl-NL" sz="1800" dirty="0"/>
-              <a:t>]</a:t>
-            </a:r>
-          </a:p>
-          <a:p>
-            <a:pPr marL="0" indent="0">
-              <a:lnSpc>
-                <a:spcPct val="150000"/>
-              </a:lnSpc>
-              <a:spcBef>
-                <a:spcPts val="600"/>
-              </a:spcBef>
-              <a:buFont typeface="Arial" panose="020B0604020202020204" pitchFamily="34" charset="0"/>
-              <a:buNone/>
-            </a:pPr>
             <a:endParaRPr lang="nl-NL" sz="1800" dirty="0">
               <a:latin typeface="Courier New" panose="02070309020205020404" pitchFamily="49" charset="0"/>
               <a:cs typeface="Courier New" panose="02070309020205020404" pitchFamily="49" charset="0"/>
@@ -31295,12 +31547,8 @@
           <a:lstStyle/>
           <a:p>
             <a:r>
-              <a:rPr lang="nl-NL" noProof="0" dirty="0" err="1"/>
-              <a:t>Branch</a:t>
-            </a:r>
-            <a:r>
               <a:rPr lang="nl-NL" noProof="0" dirty="0"/>
-              <a:t> beveiligen</a:t>
+              <a:t>Branches beveiligen</a:t>
             </a:r>
           </a:p>
         </p:txBody>
@@ -33969,12 +34217,8 @@
           <a:lstStyle/>
           <a:p>
             <a:r>
-              <a:rPr lang="nl-NL" sz="3600" noProof="0" dirty="0" err="1"/>
-              <a:t>Kanban</a:t>
-            </a:r>
-            <a:r>
               <a:rPr lang="nl-NL" sz="3600" noProof="0" dirty="0"/>
-              <a:t> Board</a:t>
+              <a:t>Boards</a:t>
             </a:r>
           </a:p>
         </p:txBody>
@@ -34187,7 +34431,7 @@
             </a:r>
             <a:r>
               <a:rPr lang="nl-NL" sz="1400" b="1" dirty="0"/>
-              <a:t>:</a:t>
+              <a:t> board:</a:t>
             </a:r>
           </a:p>
           <a:p>
@@ -34203,7 +34447,7 @@
             </a:pPr>
             <a:r>
               <a:rPr lang="nl-NL" sz="1400" dirty="0"/>
-              <a:t>Focus op voortgang:</a:t>
+              <a:t>Focus op voortgangsstadia:</a:t>
             </a:r>
           </a:p>
           <a:p>
@@ -34467,7 +34711,7 @@
           <a:p>
             <a:r>
               <a:rPr lang="nl-NL" sz="3600" noProof="0" dirty="0"/>
-              <a:t>Sprint Board</a:t>
+              <a:t>Sprints</a:t>
             </a:r>
           </a:p>
         </p:txBody>
@@ -34676,7 +34920,7 @@
             </a:pPr>
             <a:r>
               <a:rPr lang="nl-NL" sz="1400" b="1" dirty="0"/>
-              <a:t>Scrum:</a:t>
+              <a:t>Iteratief board:</a:t>
             </a:r>
           </a:p>
           <a:p>
@@ -34692,7 +34936,7 @@
             </a:pPr>
             <a:r>
               <a:rPr lang="nl-NL" sz="1400" dirty="0"/>
-              <a:t>Focus op sprints (vaste cycli):</a:t>
+              <a:t>Focus vaste iteraties:</a:t>
             </a:r>
           </a:p>
           <a:p>
@@ -34885,7 +35129,7 @@
           <p:nvPr/>
         </p:nvPicPr>
         <p:blipFill>
-          <a:blip r:embed="rId2">
+          <a:blip r:embed="rId3">
             <a:extLst>
               <a:ext uri="{28A0092B-C50C-407E-A947-70E740481C1C}">
                 <a14:useLocalDpi xmlns:a14="http://schemas.microsoft.com/office/drawing/2010/main" val="0"/>
@@ -34943,41 +35187,6 @@
       </p:grpSpPr>
       <p:sp>
         <p:nvSpPr>
-          <p:cNvPr id="2" name="Title 1">
-            <a:extLst>
-              <a:ext uri="{FF2B5EF4-FFF2-40B4-BE49-F238E27FC236}">
-                <a16:creationId xmlns:a16="http://schemas.microsoft.com/office/drawing/2014/main" id="{39A1D606-8DD1-369C-5C09-471CDD551AD5}"/>
-              </a:ext>
-            </a:extLst>
-          </p:cNvPr>
-          <p:cNvSpPr>
-            <a:spLocks noGrp="1"/>
-          </p:cNvSpPr>
-          <p:nvPr>
-            <p:ph type="title"/>
-          </p:nvPr>
-        </p:nvSpPr>
-        <p:spPr>
-          <a:xfrm>
-            <a:off x="838200" y="365126"/>
-            <a:ext cx="10515600" cy="718608"/>
-          </a:xfrm>
-        </p:spPr>
-        <p:txBody>
-          <a:bodyPr>
-            <a:normAutofit/>
-          </a:bodyPr>
-          <a:lstStyle/>
-          <a:p>
-            <a:r>
-              <a:rPr lang="nl-NL" sz="3600" noProof="0" dirty="0"/>
-              <a:t>Nog even dit…</a:t>
-            </a:r>
-          </a:p>
-        </p:txBody>
-      </p:sp>
-      <p:sp>
-        <p:nvSpPr>
           <p:cNvPr id="3" name="Content Placeholder 2">
             <a:extLst>
               <a:ext uri="{FF2B5EF4-FFF2-40B4-BE49-F238E27FC236}">
@@ -35026,7 +35235,7 @@
               <a:buNone/>
             </a:pPr>
             <a:r>
-              <a:rPr lang="nl-NL" sz="2400" dirty="0"/>
+              <a:rPr lang="nl-NL" sz="3600" dirty="0"/>
               <a:t>Bedankt voor jullie aandacht!</a:t>
             </a:r>
           </a:p>
@@ -35041,7 +35250,7 @@
               <a:buNone/>
             </a:pPr>
             <a:r>
-              <a:rPr lang="nl-NL" sz="2400" dirty="0"/>
+              <a:rPr lang="nl-NL" sz="1800" dirty="0"/>
               <a:t>Feedback op de cursus zeer welkom!</a:t>
             </a:r>
           </a:p>

</xml_diff>